<commit_message>
Update Adult Income Prediction.pptx
</commit_message>
<xml_diff>
--- a/Adult Income Prediction.pptx
+++ b/Adult Income Prediction.pptx
@@ -19,6 +19,7 @@
     <p:sldId id="264" r:id="rId14"/>
     <p:sldId id="265" r:id="rId15"/>
     <p:sldId id="266" r:id="rId16"/>
+    <p:sldId id="267" r:id="rId17"/>
   </p:sldIdLst>
   <p:sldSz cy="5143500" cx="9144000"/>
   <p:notesSz cx="6858000" cy="9144000"/>
@@ -800,7 +801,7 @@
   <p:cSld>
     <p:spTree>
       <p:nvGrpSpPr>
-        <p:cNvPr id="113" name="Shape 113"/>
+        <p:cNvPr id="107" name="Shape 107"/>
         <p:cNvGrpSpPr/>
         <p:nvPr/>
       </p:nvGrpSpPr>
@@ -814,7 +815,7 @@
       </p:grpSpPr>
       <p:sp>
         <p:nvSpPr>
-          <p:cNvPr id="114" name="Google Shape;114;g10735d32b0e_0_101:notes"/>
+          <p:cNvPr id="108" name="Google Shape;108;g10735d32b0e_0_106:notes"/>
           <p:cNvSpPr/>
           <p:nvPr>
             <p:ph idx="2" type="sldImg"/>
@@ -849,7 +850,7 @@
       </p:sp>
       <p:sp>
         <p:nvSpPr>
-          <p:cNvPr id="115" name="Google Shape;115;g10735d32b0e_0_101:notes"/>
+          <p:cNvPr id="109" name="Google Shape;109;g10735d32b0e_0_106:notes"/>
           <p:cNvSpPr txBox="1"/>
           <p:nvPr>
             <p:ph idx="1" type="body"/>
@@ -880,7 +881,8 @@
               <a:buNone/>
             </a:pPr>
             <a:r>
-              <a:t/>
+              <a:rPr lang="en"/>
+              <a:t>Show the greatest level of correlations, being education / capital gain, Ed/hours per week, and US native / Ed.</a:t>
             </a:r>
             <a:endParaRPr/>
           </a:p>
@@ -899,7 +901,7 @@
   <p:cSld>
     <p:spTree>
       <p:nvGrpSpPr>
-        <p:cNvPr id="120" name="Shape 120"/>
+        <p:cNvPr id="112" name="Shape 112"/>
         <p:cNvGrpSpPr/>
         <p:nvPr/>
       </p:nvGrpSpPr>
@@ -913,7 +915,7 @@
       </p:grpSpPr>
       <p:sp>
         <p:nvSpPr>
-          <p:cNvPr id="121" name="Google Shape;121;g10735d32b0e_0_106:notes"/>
+          <p:cNvPr id="113" name="Google Shape;113;g10803cc729a_0_5:notes"/>
           <p:cNvSpPr/>
           <p:nvPr>
             <p:ph idx="2" type="sldImg"/>
@@ -948,7 +950,107 @@
       </p:sp>
       <p:sp>
         <p:nvSpPr>
-          <p:cNvPr id="122" name="Google Shape;122;g10735d32b0e_0_106:notes"/>
+          <p:cNvPr id="114" name="Google Shape;114;g10803cc729a_0_5:notes"/>
+          <p:cNvSpPr txBox="1"/>
+          <p:nvPr>
+            <p:ph idx="1" type="body"/>
+          </p:nvPr>
+        </p:nvSpPr>
+        <p:spPr>
+          <a:xfrm>
+            <a:off x="685800" y="4343400"/>
+            <a:ext cx="5486400" cy="4114800"/>
+          </a:xfrm>
+          <a:prstGeom prst="rect">
+            <a:avLst/>
+          </a:prstGeom>
+        </p:spPr>
+        <p:txBody>
+          <a:bodyPr anchorCtr="0" anchor="t" bIns="91425" lIns="91425" spcFirstLastPara="1" rIns="91425" wrap="square" tIns="91425">
+            <a:noAutofit/>
+          </a:bodyPr>
+          <a:lstStyle/>
+          <a:p>
+            <a:pPr indent="0" lvl="0" marL="0" rtl="0" algn="l">
+              <a:spcBef>
+                <a:spcPts val="0"/>
+              </a:spcBef>
+              <a:spcAft>
+                <a:spcPts val="0"/>
+              </a:spcAft>
+              <a:buNone/>
+            </a:pPr>
+            <a:r>
+              <a:rPr lang="en"/>
+              <a:t>Refresh on the highlights</a:t>
+            </a:r>
+            <a:endParaRPr/>
+          </a:p>
+        </p:txBody>
+      </p:sp>
+    </p:spTree>
+  </p:cSld>
+  <p:clrMapOvr>
+    <a:masterClrMapping/>
+  </p:clrMapOvr>
+</p:notes>
+</file>
+
+<file path=ppt/notesSlides/notesSlide12.xml><?xml version="1.0" encoding="utf-8"?>
+<p:notes xmlns:a="http://schemas.openxmlformats.org/drawingml/2006/main" xmlns:r="http://schemas.openxmlformats.org/officeDocument/2006/relationships" xmlns:mc="http://schemas.openxmlformats.org/markup-compatibility/2006" xmlns:mv="urn:schemas-microsoft-com:mac:vml" xmlns:p="http://schemas.openxmlformats.org/presentationml/2006/main" xmlns:c="http://schemas.openxmlformats.org/drawingml/2006/chart" xmlns:dgm="http://schemas.openxmlformats.org/drawingml/2006/diagram" xmlns:o="urn:schemas-microsoft-com:office:office" xmlns:v="urn:schemas-microsoft-com:vml" xmlns:pvml="urn:schemas-microsoft-com:office:powerpoint" xmlns:com="http://schemas.openxmlformats.org/drawingml/2006/compatibility" xmlns:p14="http://schemas.microsoft.com/office/powerpoint/2010/main" xmlns:p15="http://schemas.microsoft.com/office/powerpoint/2012/main" xmlns:ahyp="http://schemas.microsoft.com/office/drawing/2018/hyperlinkcolor" showMasterPhAnim="0" showMasterSp="0">
+  <p:cSld>
+    <p:spTree>
+      <p:nvGrpSpPr>
+        <p:cNvPr id="118" name="Shape 118"/>
+        <p:cNvGrpSpPr/>
+        <p:nvPr/>
+      </p:nvGrpSpPr>
+      <p:grpSpPr>
+        <a:xfrm>
+          <a:off x="0" y="0"/>
+          <a:ext cx="0" cy="0"/>
+          <a:chOff x="0" y="0"/>
+          <a:chExt cx="0" cy="0"/>
+        </a:xfrm>
+      </p:grpSpPr>
+      <p:sp>
+        <p:nvSpPr>
+          <p:cNvPr id="119" name="Google Shape;119;g10803cc729a_0_0:notes"/>
+          <p:cNvSpPr/>
+          <p:nvPr>
+            <p:ph idx="2" type="sldImg"/>
+          </p:nvPr>
+        </p:nvSpPr>
+        <p:spPr>
+          <a:xfrm>
+            <a:off x="381300" y="685800"/>
+            <a:ext cx="6096000" cy="3429000"/>
+          </a:xfrm>
+          <a:custGeom>
+            <a:rect b="b" l="l" r="r" t="t"/>
+            <a:pathLst>
+              <a:path extrusionOk="0" h="120000" w="120000">
+                <a:moveTo>
+                  <a:pt x="0" y="0"/>
+                </a:moveTo>
+                <a:lnTo>
+                  <a:pt x="120000" y="0"/>
+                </a:lnTo>
+                <a:lnTo>
+                  <a:pt x="120000" y="120000"/>
+                </a:lnTo>
+                <a:lnTo>
+                  <a:pt x="0" y="120000"/>
+                </a:lnTo>
+                <a:close/>
+              </a:path>
+            </a:pathLst>
+          </a:custGeom>
+        </p:spPr>
+      </p:sp>
+      <p:sp>
+        <p:nvSpPr>
+          <p:cNvPr id="120" name="Google Shape;120;g10803cc729a_0_0:notes"/>
           <p:cNvSpPr txBox="1"/>
           <p:nvPr>
             <p:ph idx="1" type="body"/>
@@ -1078,7 +1180,16 @@
               <a:buNone/>
             </a:pPr>
             <a:r>
-              <a:t/>
+              <a:rPr lang="en"/>
+              <a:t>Introduction of adult income distribution: Share the basic information and state that we will be searching for </a:t>
+            </a:r>
+            <a:r>
+              <a:rPr lang="en"/>
+              <a:t>criteria</a:t>
+            </a:r>
+            <a:r>
+              <a:rPr lang="en"/>
+              <a:t> which greatly steps away from this 76/24 split. The bigger the difference the greater the influence.</a:t>
             </a:r>
             <a:endParaRPr/>
           </a:p>
@@ -1097,7 +1208,7 @@
   <p:cSld>
     <p:spTree>
       <p:nvGrpSpPr>
-        <p:cNvPr id="65" name="Shape 65"/>
+        <p:cNvPr id="64" name="Shape 64"/>
         <p:cNvGrpSpPr/>
         <p:nvPr/>
       </p:nvGrpSpPr>
@@ -1111,7 +1222,7 @@
       </p:grpSpPr>
       <p:sp>
         <p:nvSpPr>
-          <p:cNvPr id="66" name="Google Shape;66;g10735d32b0e_0_60:notes"/>
+          <p:cNvPr id="65" name="Google Shape;65;g10735d32b0e_0_71:notes"/>
           <p:cNvSpPr/>
           <p:nvPr>
             <p:ph idx="2" type="sldImg"/>
@@ -1146,7 +1257,7 @@
       </p:sp>
       <p:sp>
         <p:nvSpPr>
-          <p:cNvPr id="67" name="Google Shape;67;g10735d32b0e_0_60:notes"/>
+          <p:cNvPr id="66" name="Google Shape;66;g10735d32b0e_0_71:notes"/>
           <p:cNvSpPr txBox="1"/>
           <p:nvPr>
             <p:ph idx="1" type="body"/>
@@ -1177,7 +1288,16 @@
               <a:buNone/>
             </a:pPr>
             <a:r>
-              <a:t/>
+              <a:rPr lang="en"/>
+              <a:t>Ed </a:t>
+            </a:r>
+            <a:r>
+              <a:rPr lang="en"/>
+              <a:t>audience</a:t>
+            </a:r>
+            <a:r>
+              <a:rPr lang="en"/>
+              <a:t> on normalization, There are more males in the data pool than female. So if we resample with equal counts of male and female we get normalized data</a:t>
             </a:r>
             <a:endParaRPr/>
           </a:p>
@@ -1196,7 +1316,7 @@
   <p:cSld>
     <p:spTree>
       <p:nvGrpSpPr>
-        <p:cNvPr id="72" name="Shape 72"/>
+        <p:cNvPr id="70" name="Shape 70"/>
         <p:cNvGrpSpPr/>
         <p:nvPr/>
       </p:nvGrpSpPr>
@@ -1210,7 +1330,7 @@
       </p:grpSpPr>
       <p:sp>
         <p:nvSpPr>
-          <p:cNvPr id="73" name="Google Shape;73;g10735d32b0e_0_71:notes"/>
+          <p:cNvPr id="71" name="Google Shape;71;g10735d32b0e_0_76:notes"/>
           <p:cNvSpPr/>
           <p:nvPr>
             <p:ph idx="2" type="sldImg"/>
@@ -1245,7 +1365,7 @@
       </p:sp>
       <p:sp>
         <p:nvSpPr>
-          <p:cNvPr id="74" name="Google Shape;74;g10735d32b0e_0_71:notes"/>
+          <p:cNvPr id="72" name="Google Shape;72;g10735d32b0e_0_76:notes"/>
           <p:cNvSpPr txBox="1"/>
           <p:nvPr>
             <p:ph idx="1" type="body"/>
@@ -1276,7 +1396,12 @@
               <a:buNone/>
             </a:pPr>
             <a:r>
-              <a:t/>
+              <a:rPr lang="en"/>
+              <a:t>Show the info on how many people polled are US natives as </a:t>
+            </a:r>
+            <a:r>
+              <a:rPr lang="en"/>
+              <a:t>well as a raw count of how many are below and above 50k</a:t>
             </a:r>
             <a:endParaRPr/>
           </a:p>
@@ -1295,7 +1420,7 @@
   <p:cSld>
     <p:spTree>
       <p:nvGrpSpPr>
-        <p:cNvPr id="78" name="Shape 78"/>
+        <p:cNvPr id="77" name="Shape 77"/>
         <p:cNvGrpSpPr/>
         <p:nvPr/>
       </p:nvGrpSpPr>
@@ -1309,7 +1434,7 @@
       </p:grpSpPr>
       <p:sp>
         <p:nvSpPr>
-          <p:cNvPr id="79" name="Google Shape;79;g10735d32b0e_0_76:notes"/>
+          <p:cNvPr id="78" name="Google Shape;78;g10735d32b0e_0_81:notes"/>
           <p:cNvSpPr/>
           <p:nvPr>
             <p:ph idx="2" type="sldImg"/>
@@ -1344,7 +1469,7 @@
       </p:sp>
       <p:sp>
         <p:nvSpPr>
-          <p:cNvPr id="80" name="Google Shape;80;g10735d32b0e_0_76:notes"/>
+          <p:cNvPr id="79" name="Google Shape;79;g10735d32b0e_0_81:notes"/>
           <p:cNvSpPr txBox="1"/>
           <p:nvPr>
             <p:ph idx="1" type="body"/>
@@ -1375,7 +1500,8 @@
               <a:buNone/>
             </a:pPr>
             <a:r>
-              <a:t/>
+              <a:rPr lang="en"/>
+              <a:t>Review of the previous slide progressing to the normalized data. </a:t>
             </a:r>
             <a:endParaRPr/>
           </a:p>
@@ -1394,7 +1520,7 @@
   <p:cSld>
     <p:spTree>
       <p:nvGrpSpPr>
-        <p:cNvPr id="86" name="Shape 86"/>
+        <p:cNvPr id="83" name="Shape 83"/>
         <p:cNvGrpSpPr/>
         <p:nvPr/>
       </p:nvGrpSpPr>
@@ -1408,7 +1534,7 @@
       </p:grpSpPr>
       <p:sp>
         <p:nvSpPr>
-          <p:cNvPr id="87" name="Google Shape;87;g10735d32b0e_0_81:notes"/>
+          <p:cNvPr id="84" name="Google Shape;84;g10735d32b0e_0_86:notes"/>
           <p:cNvSpPr/>
           <p:nvPr>
             <p:ph idx="2" type="sldImg"/>
@@ -1443,7 +1569,7 @@
       </p:sp>
       <p:sp>
         <p:nvSpPr>
-          <p:cNvPr id="88" name="Google Shape;88;g10735d32b0e_0_81:notes"/>
+          <p:cNvPr id="85" name="Google Shape;85;g10735d32b0e_0_86:notes"/>
           <p:cNvSpPr txBox="1"/>
           <p:nvPr>
             <p:ph idx="1" type="body"/>
@@ -1474,7 +1600,16 @@
               <a:buNone/>
             </a:pPr>
             <a:r>
-              <a:t/>
+              <a:rPr lang="en"/>
+              <a:t>Highlight how married people have a much higher ratio of people making above 50k. </a:t>
+            </a:r>
+            <a:r>
+              <a:rPr lang="en"/>
+              <a:t>Hypothesis</a:t>
+            </a:r>
+            <a:r>
+              <a:rPr lang="en"/>
+              <a:t> this may be due to those who know how to balance a relationship are better able to balance work relationships.</a:t>
             </a:r>
             <a:endParaRPr/>
           </a:p>
@@ -1493,7 +1628,7 @@
   <p:cSld>
     <p:spTree>
       <p:nvGrpSpPr>
-        <p:cNvPr id="92" name="Shape 92"/>
+        <p:cNvPr id="89" name="Shape 89"/>
         <p:cNvGrpSpPr/>
         <p:nvPr/>
       </p:nvGrpSpPr>
@@ -1507,7 +1642,7 @@
       </p:grpSpPr>
       <p:sp>
         <p:nvSpPr>
-          <p:cNvPr id="93" name="Google Shape;93;g10735d32b0e_0_86:notes"/>
+          <p:cNvPr id="90" name="Google Shape;90;g10735d32b0e_0_91:notes"/>
           <p:cNvSpPr/>
           <p:nvPr>
             <p:ph idx="2" type="sldImg"/>
@@ -1542,7 +1677,7 @@
       </p:sp>
       <p:sp>
         <p:nvSpPr>
-          <p:cNvPr id="94" name="Google Shape;94;g10735d32b0e_0_86:notes"/>
+          <p:cNvPr id="91" name="Google Shape;91;g10735d32b0e_0_91:notes"/>
           <p:cNvSpPr txBox="1"/>
           <p:nvPr>
             <p:ph idx="1" type="body"/>
@@ -1573,7 +1708,8 @@
               <a:buNone/>
             </a:pPr>
             <a:r>
-              <a:t/>
+              <a:rPr lang="en"/>
+              <a:t>Point out the high and low outliers, each one by one. Take this time to ask any questions with more detailed information on hand.</a:t>
             </a:r>
             <a:endParaRPr/>
           </a:p>
@@ -1592,7 +1728,7 @@
   <p:cSld>
     <p:spTree>
       <p:nvGrpSpPr>
-        <p:cNvPr id="99" name="Shape 99"/>
+        <p:cNvPr id="95" name="Shape 95"/>
         <p:cNvGrpSpPr/>
         <p:nvPr/>
       </p:nvGrpSpPr>
@@ -1606,7 +1742,7 @@
       </p:grpSpPr>
       <p:sp>
         <p:nvSpPr>
-          <p:cNvPr id="100" name="Google Shape;100;g10735d32b0e_0_91:notes"/>
+          <p:cNvPr id="96" name="Google Shape;96;g10735d32b0e_0_96:notes"/>
           <p:cNvSpPr/>
           <p:nvPr>
             <p:ph idx="2" type="sldImg"/>
@@ -1641,7 +1777,7 @@
       </p:sp>
       <p:sp>
         <p:nvSpPr>
-          <p:cNvPr id="101" name="Google Shape;101;g10735d32b0e_0_91:notes"/>
+          <p:cNvPr id="97" name="Google Shape;97;g10735d32b0e_0_96:notes"/>
           <p:cNvSpPr txBox="1"/>
           <p:nvPr>
             <p:ph idx="1" type="body"/>
@@ -1672,7 +1808,8 @@
               <a:buNone/>
             </a:pPr>
             <a:r>
-              <a:t/>
+              <a:rPr lang="en"/>
+              <a:t>Point out again, as before with those who are in a married relationship, those who are husbands or wives they have a much greater chance of earning over 50k</a:t>
             </a:r>
             <a:endParaRPr/>
           </a:p>
@@ -1691,7 +1828,7 @@
   <p:cSld>
     <p:spTree>
       <p:nvGrpSpPr>
-        <p:cNvPr id="106" name="Shape 106"/>
+        <p:cNvPr id="101" name="Shape 101"/>
         <p:cNvGrpSpPr/>
         <p:nvPr/>
       </p:nvGrpSpPr>
@@ -1705,7 +1842,7 @@
       </p:grpSpPr>
       <p:sp>
         <p:nvSpPr>
-          <p:cNvPr id="107" name="Google Shape;107;g10735d32b0e_0_96:notes"/>
+          <p:cNvPr id="102" name="Google Shape;102;g10735d32b0e_0_101:notes"/>
           <p:cNvSpPr/>
           <p:nvPr>
             <p:ph idx="2" type="sldImg"/>
@@ -1740,7 +1877,7 @@
       </p:sp>
       <p:sp>
         <p:nvSpPr>
-          <p:cNvPr id="108" name="Google Shape;108;g10735d32b0e_0_96:notes"/>
+          <p:cNvPr id="103" name="Google Shape;103;g10735d32b0e_0_101:notes"/>
           <p:cNvSpPr txBox="1"/>
           <p:nvPr>
             <p:ph idx="1" type="body"/>
@@ -1771,7 +1908,8 @@
               <a:buNone/>
             </a:pPr>
             <a:r>
-              <a:t/>
+              <a:rPr lang="en"/>
+              <a:t>Getting racial, show the ratio's, also point out this data doesn't show any big outliers</a:t>
             </a:r>
             <a:endParaRPr/>
           </a:p>
@@ -6503,7 +6641,7 @@
     <p:bg>
       <p:bgPr>
         <a:solidFill>
-          <a:srgbClr val="999999"/>
+          <a:schemeClr val="dk1"/>
         </a:solidFill>
       </p:bgPr>
     </p:bg>
@@ -6733,13 +6871,13 @@
     <p:bg>
       <p:bgPr>
         <a:solidFill>
-          <a:schemeClr val="lt2"/>
+          <a:schemeClr val="dk1"/>
         </a:solidFill>
       </p:bgPr>
     </p:bg>
     <p:spTree>
       <p:nvGrpSpPr>
-        <p:cNvPr id="116" name="Shape 116"/>
+        <p:cNvPr id="110" name="Shape 110"/>
         <p:cNvGrpSpPr/>
         <p:nvPr/>
       </p:nvGrpSpPr>
@@ -6751,87 +6889,9 @@
           <a:chExt cx="0" cy="0"/>
         </a:xfrm>
       </p:grpSpPr>
-      <p:sp>
-        <p:nvSpPr>
-          <p:cNvPr id="117" name="Google Shape;117;p22"/>
-          <p:cNvSpPr txBox="1"/>
-          <p:nvPr>
-            <p:ph type="title"/>
-          </p:nvPr>
-        </p:nvSpPr>
-        <p:spPr>
-          <a:xfrm>
-            <a:off x="311700" y="445025"/>
-            <a:ext cx="8520600" cy="572700"/>
-          </a:xfrm>
-          <a:prstGeom prst="rect">
-            <a:avLst/>
-          </a:prstGeom>
-        </p:spPr>
-        <p:txBody>
-          <a:bodyPr anchorCtr="0" anchor="t" bIns="91425" lIns="91425" spcFirstLastPara="1" rIns="91425" wrap="square" tIns="91425">
-            <a:normAutofit fontScale="90000"/>
-          </a:bodyPr>
-          <a:lstStyle/>
-          <a:p>
-            <a:pPr indent="0" lvl="0" marL="0" rtl="0" algn="l">
-              <a:spcBef>
-                <a:spcPts val="0"/>
-              </a:spcBef>
-              <a:spcAft>
-                <a:spcPts val="0"/>
-              </a:spcAft>
-              <a:buNone/>
-            </a:pPr>
-            <a:r>
-              <a:t/>
-            </a:r>
-            <a:endParaRPr/>
-          </a:p>
-        </p:txBody>
-      </p:sp>
-      <p:sp>
-        <p:nvSpPr>
-          <p:cNvPr id="118" name="Google Shape;118;p22"/>
-          <p:cNvSpPr txBox="1"/>
-          <p:nvPr>
-            <p:ph idx="1" type="body"/>
-          </p:nvPr>
-        </p:nvSpPr>
-        <p:spPr>
-          <a:xfrm>
-            <a:off x="311700" y="1152475"/>
-            <a:ext cx="8520600" cy="3416400"/>
-          </a:xfrm>
-          <a:prstGeom prst="rect">
-            <a:avLst/>
-          </a:prstGeom>
-        </p:spPr>
-        <p:txBody>
-          <a:bodyPr anchorCtr="0" anchor="t" bIns="91425" lIns="91425" spcFirstLastPara="1" rIns="91425" wrap="square" tIns="91425">
-            <a:normAutofit/>
-          </a:bodyPr>
-          <a:lstStyle/>
-          <a:p>
-            <a:pPr indent="0" lvl="0" marL="0" rtl="0" algn="l">
-              <a:spcBef>
-                <a:spcPts val="0"/>
-              </a:spcBef>
-              <a:spcAft>
-                <a:spcPts val="1200"/>
-              </a:spcAft>
-              <a:buNone/>
-            </a:pPr>
-            <a:r>
-              <a:t/>
-            </a:r>
-            <a:endParaRPr/>
-          </a:p>
-        </p:txBody>
-      </p:sp>
       <p:pic>
         <p:nvPicPr>
-          <p:cNvPr id="119" name="Google Shape;119;p22"/>
+          <p:cNvPr id="111" name="Google Shape;111;p22"/>
           <p:cNvPicPr preferRelativeResize="0"/>
           <p:nvPr/>
         </p:nvPicPr>
@@ -6845,8 +6905,8 @@
         </p:blipFill>
         <p:spPr>
           <a:xfrm>
-            <a:off x="1332763" y="1152473"/>
-            <a:ext cx="6478479" cy="3416399"/>
+            <a:off x="2335563" y="333138"/>
+            <a:ext cx="4472873" cy="4477225"/>
           </a:xfrm>
           <a:prstGeom prst="rect">
             <a:avLst/>
@@ -6871,13 +6931,13 @@
     <p:bg>
       <p:bgPr>
         <a:solidFill>
-          <a:schemeClr val="lt2"/>
+          <a:schemeClr val="dk1"/>
         </a:solidFill>
       </p:bgPr>
     </p:bg>
     <p:spTree>
       <p:nvGrpSpPr>
-        <p:cNvPr id="123" name="Shape 123"/>
+        <p:cNvPr id="115" name="Shape 115"/>
         <p:cNvGrpSpPr/>
         <p:nvPr/>
       </p:nvGrpSpPr>
@@ -6891,7 +6951,56 @@
       </p:grpSpPr>
       <p:sp>
         <p:nvSpPr>
-          <p:cNvPr id="124" name="Google Shape;124;p23"/>
+          <p:cNvPr id="116" name="Google Shape;116;p23"/>
+          <p:cNvSpPr txBox="1"/>
+          <p:nvPr>
+            <p:ph type="title"/>
+          </p:nvPr>
+        </p:nvSpPr>
+        <p:spPr>
+          <a:xfrm>
+            <a:off x="311700" y="445025"/>
+            <a:ext cx="8520600" cy="572700"/>
+          </a:xfrm>
+          <a:prstGeom prst="rect">
+            <a:avLst/>
+          </a:prstGeom>
+        </p:spPr>
+        <p:txBody>
+          <a:bodyPr anchorCtr="0" anchor="t" bIns="91425" lIns="91425" spcFirstLastPara="1" rIns="91425" wrap="square" tIns="91425">
+            <a:noAutofit/>
+          </a:bodyPr>
+          <a:lstStyle/>
+          <a:p>
+            <a:pPr indent="0" lvl="0" marL="0" rtl="0" algn="ctr">
+              <a:spcBef>
+                <a:spcPts val="0"/>
+              </a:spcBef>
+              <a:spcAft>
+                <a:spcPts val="0"/>
+              </a:spcAft>
+              <a:buSzPts val="990"/>
+              <a:buNone/>
+            </a:pPr>
+            <a:r>
+              <a:rPr lang="en" sz="3020">
+                <a:solidFill>
+                  <a:schemeClr val="lt1"/>
+                </a:solidFill>
+              </a:rPr>
+              <a:t>Highlights</a:t>
+            </a:r>
+            <a:endParaRPr sz="3020">
+              <a:solidFill>
+                <a:schemeClr val="lt1"/>
+              </a:solidFill>
+            </a:endParaRPr>
+          </a:p>
+        </p:txBody>
+      </p:sp>
+      <p:sp>
+        <p:nvSpPr>
+          <p:cNvPr id="117" name="Google Shape;117;p23"/>
           <p:cNvSpPr txBox="1"/>
           <p:nvPr>
             <p:ph idx="1" type="body"/>
@@ -6899,8 +7008,8 @@
         </p:nvSpPr>
         <p:spPr>
           <a:xfrm>
-            <a:off x="311700" y="1152475"/>
-            <a:ext cx="8520600" cy="3416400"/>
+            <a:off x="569850" y="1554150"/>
+            <a:ext cx="8262300" cy="3014700"/>
           </a:xfrm>
           <a:prstGeom prst="rect">
             <a:avLst/>
@@ -6912,12 +7021,124 @@
           </a:bodyPr>
           <a:lstStyle/>
           <a:p>
+            <a:pPr indent="-355600" lvl="0" marL="457200" rtl="0" algn="l">
+              <a:spcBef>
+                <a:spcPts val="0"/>
+              </a:spcBef>
+              <a:spcAft>
+                <a:spcPts val="0"/>
+              </a:spcAft>
+              <a:buClr>
+                <a:schemeClr val="lt1"/>
+              </a:buClr>
+              <a:buSzPts val="2000"/>
+              <a:buChar char="●"/>
+            </a:pPr>
+            <a:r>
+              <a:rPr lang="en" sz="2000">
+                <a:solidFill>
+                  <a:schemeClr val="lt1"/>
+                </a:solidFill>
+              </a:rPr>
+              <a:t>Committed Relationships</a:t>
+            </a:r>
+            <a:endParaRPr sz="2000">
+              <a:solidFill>
+                <a:schemeClr val="lt1"/>
+              </a:solidFill>
+            </a:endParaRPr>
+          </a:p>
+          <a:p>
+            <a:pPr indent="-355600" lvl="0" marL="457200" rtl="0" algn="l">
+              <a:spcBef>
+                <a:spcPts val="0"/>
+              </a:spcBef>
+              <a:spcAft>
+                <a:spcPts val="0"/>
+              </a:spcAft>
+              <a:buClr>
+                <a:schemeClr val="lt1"/>
+              </a:buClr>
+              <a:buSzPts val="2000"/>
+              <a:buChar char="●"/>
+            </a:pPr>
+            <a:r>
+              <a:rPr lang="en" sz="2000">
+                <a:solidFill>
+                  <a:schemeClr val="lt1"/>
+                </a:solidFill>
+              </a:rPr>
+              <a:t>Education</a:t>
+            </a:r>
+            <a:endParaRPr sz="2000">
+              <a:solidFill>
+                <a:schemeClr val="lt1"/>
+              </a:solidFill>
+            </a:endParaRPr>
+          </a:p>
+        </p:txBody>
+      </p:sp>
+    </p:spTree>
+  </p:cSld>
+  <p:clrMapOvr>
+    <a:masterClrMapping/>
+  </p:clrMapOvr>
+</p:sld>
+</file>
+
+<file path=ppt/slides/slide12.xml><?xml version="1.0" encoding="utf-8"?>
+<p:sld xmlns:a="http://schemas.openxmlformats.org/drawingml/2006/main" xmlns:r="http://schemas.openxmlformats.org/officeDocument/2006/relationships" xmlns:mc="http://schemas.openxmlformats.org/markup-compatibility/2006" xmlns:mv="urn:schemas-microsoft-com:mac:vml" xmlns:p="http://schemas.openxmlformats.org/presentationml/2006/main" xmlns:c="http://schemas.openxmlformats.org/drawingml/2006/chart" xmlns:dgm="http://schemas.openxmlformats.org/drawingml/2006/diagram" xmlns:o="urn:schemas-microsoft-com:office:office" xmlns:v="urn:schemas-microsoft-com:vml" xmlns:pvml="urn:schemas-microsoft-com:office:powerpoint" xmlns:com="http://schemas.openxmlformats.org/drawingml/2006/compatibility" xmlns:p14="http://schemas.microsoft.com/office/powerpoint/2010/main" xmlns:p15="http://schemas.microsoft.com/office/powerpoint/2012/main" xmlns:ahyp="http://schemas.microsoft.com/office/drawing/2018/hyperlinkcolor">
+  <p:cSld>
+    <p:bg>
+      <p:bgPr>
+        <a:solidFill>
+          <a:schemeClr val="dk1"/>
+        </a:solidFill>
+      </p:bgPr>
+    </p:bg>
+    <p:spTree>
+      <p:nvGrpSpPr>
+        <p:cNvPr id="121" name="Shape 121"/>
+        <p:cNvGrpSpPr/>
+        <p:nvPr/>
+      </p:nvGrpSpPr>
+      <p:grpSpPr>
+        <a:xfrm>
+          <a:off x="0" y="0"/>
+          <a:ext cx="0" cy="0"/>
+          <a:chOff x="0" y="0"/>
+          <a:chExt cx="0" cy="0"/>
+        </a:xfrm>
+      </p:grpSpPr>
+      <p:sp>
+        <p:nvSpPr>
+          <p:cNvPr id="122" name="Google Shape;122;p24"/>
+          <p:cNvSpPr txBox="1"/>
+          <p:nvPr>
+            <p:ph type="title"/>
+          </p:nvPr>
+        </p:nvSpPr>
+        <p:spPr>
+          <a:xfrm>
+            <a:off x="311700" y="445025"/>
+            <a:ext cx="8520600" cy="572700"/>
+          </a:xfrm>
+          <a:prstGeom prst="rect">
+            <a:avLst/>
+          </a:prstGeom>
+        </p:spPr>
+        <p:txBody>
+          <a:bodyPr anchorCtr="0" anchor="t" bIns="91425" lIns="91425" spcFirstLastPara="1" rIns="91425" wrap="square" tIns="91425">
+            <a:normAutofit fontScale="90000"/>
+          </a:bodyPr>
+          <a:lstStyle/>
+          <a:p>
             <a:pPr indent="0" lvl="0" marL="0" rtl="0" algn="l">
               <a:spcBef>
                 <a:spcPts val="0"/>
               </a:spcBef>
               <a:spcAft>
-                <a:spcPts val="1200"/>
+                <a:spcPts val="0"/>
               </a:spcAft>
               <a:buNone/>
             </a:pPr>
@@ -6928,34 +7149,54 @@
           </a:p>
         </p:txBody>
       </p:sp>
-      <p:pic>
-        <p:nvPicPr>
-          <p:cNvPr id="125" name="Google Shape;125;p23"/>
-          <p:cNvPicPr preferRelativeResize="0"/>
-          <p:nvPr/>
-        </p:nvPicPr>
-        <p:blipFill>
-          <a:blip r:embed="rId3">
-            <a:alphaModFix/>
-          </a:blip>
-          <a:stretch>
-            <a:fillRect/>
-          </a:stretch>
-        </p:blipFill>
+      <p:sp>
+        <p:nvSpPr>
+          <p:cNvPr id="123" name="Google Shape;123;p24"/>
+          <p:cNvSpPr txBox="1"/>
+          <p:nvPr>
+            <p:ph idx="1" type="body"/>
+          </p:nvPr>
+        </p:nvSpPr>
         <p:spPr>
           <a:xfrm>
-            <a:off x="433800" y="388750"/>
-            <a:ext cx="4472873" cy="4477225"/>
+            <a:off x="311700" y="1628150"/>
+            <a:ext cx="8520600" cy="2940600"/>
           </a:xfrm>
           <a:prstGeom prst="rect">
             <a:avLst/>
           </a:prstGeom>
-          <a:noFill/>
-          <a:ln>
-            <a:noFill/>
-          </a:ln>
         </p:spPr>
-      </p:pic>
+        <p:txBody>
+          <a:bodyPr anchorCtr="0" anchor="t" bIns="91425" lIns="91425" spcFirstLastPara="1" rIns="91425" wrap="square" tIns="91425">
+            <a:normAutofit/>
+          </a:bodyPr>
+          <a:lstStyle/>
+          <a:p>
+            <a:pPr indent="0" lvl="0" marL="0" rtl="0" algn="ctr">
+              <a:spcBef>
+                <a:spcPts val="0"/>
+              </a:spcBef>
+              <a:spcAft>
+                <a:spcPts val="1200"/>
+              </a:spcAft>
+              <a:buNone/>
+            </a:pPr>
+            <a:r>
+              <a:rPr lang="en" sz="4600">
+                <a:solidFill>
+                  <a:schemeClr val="lt1"/>
+                </a:solidFill>
+              </a:rPr>
+              <a:t>Questions:</a:t>
+            </a:r>
+            <a:endParaRPr sz="4600">
+              <a:solidFill>
+                <a:schemeClr val="lt1"/>
+              </a:solidFill>
+            </a:endParaRPr>
+          </a:p>
+        </p:txBody>
+      </p:sp>
     </p:spTree>
   </p:cSld>
   <p:clrMapOvr>
@@ -6970,7 +7211,7 @@
     <p:bg>
       <p:bgPr>
         <a:solidFill>
-          <a:schemeClr val="lt2"/>
+          <a:schemeClr val="dk1"/>
         </a:solidFill>
       </p:bgPr>
     </p:bg>
@@ -7027,48 +7268,9 @@
           </a:p>
         </p:txBody>
       </p:sp>
-      <p:sp>
-        <p:nvSpPr>
-          <p:cNvPr id="63" name="Google Shape;63;p14"/>
-          <p:cNvSpPr txBox="1"/>
-          <p:nvPr>
-            <p:ph idx="1" type="body"/>
-          </p:nvPr>
-        </p:nvSpPr>
-        <p:spPr>
-          <a:xfrm>
-            <a:off x="311700" y="1152475"/>
-            <a:ext cx="8520600" cy="3416400"/>
-          </a:xfrm>
-          <a:prstGeom prst="rect">
-            <a:avLst/>
-          </a:prstGeom>
-        </p:spPr>
-        <p:txBody>
-          <a:bodyPr anchorCtr="0" anchor="t" bIns="91425" lIns="91425" spcFirstLastPara="1" rIns="91425" wrap="square" tIns="91425">
-            <a:normAutofit/>
-          </a:bodyPr>
-          <a:lstStyle/>
-          <a:p>
-            <a:pPr indent="0" lvl="0" marL="0" rtl="0" algn="l">
-              <a:spcBef>
-                <a:spcPts val="0"/>
-              </a:spcBef>
-              <a:spcAft>
-                <a:spcPts val="1200"/>
-              </a:spcAft>
-              <a:buNone/>
-            </a:pPr>
-            <a:r>
-              <a:t/>
-            </a:r>
-            <a:endParaRPr/>
-          </a:p>
-        </p:txBody>
-      </p:sp>
       <p:pic>
         <p:nvPicPr>
-          <p:cNvPr id="64" name="Google Shape;64;p14"/>
+          <p:cNvPr id="63" name="Google Shape;63;p14"/>
           <p:cNvPicPr preferRelativeResize="0"/>
           <p:nvPr/>
         </p:nvPicPr>
@@ -7108,13 +7310,13 @@
     <p:bg>
       <p:bgPr>
         <a:solidFill>
-          <a:schemeClr val="lt2"/>
+          <a:schemeClr val="dk1"/>
         </a:solidFill>
       </p:bgPr>
     </p:bg>
     <p:spTree>
       <p:nvGrpSpPr>
-        <p:cNvPr id="68" name="Shape 68"/>
+        <p:cNvPr id="67" name="Shape 67"/>
         <p:cNvGrpSpPr/>
         <p:nvPr/>
       </p:nvGrpSpPr>
@@ -7128,56 +7330,7 @@
       </p:grpSpPr>
       <p:sp>
         <p:nvSpPr>
-          <p:cNvPr id="69" name="Google Shape;69;p15"/>
-          <p:cNvSpPr txBox="1"/>
-          <p:nvPr>
-            <p:ph type="title"/>
-          </p:nvPr>
-        </p:nvSpPr>
-        <p:spPr>
-          <a:xfrm>
-            <a:off x="311700" y="673475"/>
-            <a:ext cx="8520600" cy="344400"/>
-          </a:xfrm>
-          <a:prstGeom prst="rect">
-            <a:avLst/>
-          </a:prstGeom>
-        </p:spPr>
-        <p:txBody>
-          <a:bodyPr anchorCtr="0" anchor="t" bIns="91425" lIns="91425" spcFirstLastPara="1" rIns="91425" wrap="square" tIns="91425">
-            <a:normAutofit fontScale="90000"/>
-          </a:bodyPr>
-          <a:lstStyle/>
-          <a:p>
-            <a:pPr indent="0" lvl="0" marL="0" rtl="0" algn="ctr">
-              <a:spcBef>
-                <a:spcPts val="0"/>
-              </a:spcBef>
-              <a:spcAft>
-                <a:spcPts val="0"/>
-              </a:spcAft>
-              <a:buSzPct val="61111"/>
-              <a:buNone/>
-            </a:pPr>
-            <a:r>
-              <a:rPr lang="en" sz="1620">
-                <a:solidFill>
-                  <a:schemeClr val="lt1"/>
-                </a:solidFill>
-              </a:rPr>
-              <a:t>Numerical Correlations</a:t>
-            </a:r>
-            <a:endParaRPr sz="1620">
-              <a:solidFill>
-                <a:schemeClr val="lt1"/>
-              </a:solidFill>
-            </a:endParaRPr>
-          </a:p>
-        </p:txBody>
-      </p:sp>
-      <p:sp>
-        <p:nvSpPr>
-          <p:cNvPr id="70" name="Google Shape;70;p15"/>
+          <p:cNvPr id="68" name="Google Shape;68;p15"/>
           <p:cNvSpPr txBox="1"/>
           <p:nvPr>
             <p:ph idx="1" type="body"/>
@@ -7185,8 +7338,8 @@
         </p:nvSpPr>
         <p:spPr>
           <a:xfrm>
-            <a:off x="311700" y="1152475"/>
-            <a:ext cx="8520600" cy="3416400"/>
+            <a:off x="4248025" y="1598550"/>
+            <a:ext cx="3752100" cy="2970300"/>
           </a:xfrm>
           <a:prstGeom prst="rect">
             <a:avLst/>
@@ -7198,106 +7351,7 @@
           </a:bodyPr>
           <a:lstStyle/>
           <a:p>
-            <a:pPr indent="0" lvl="0" marL="0" rtl="0" algn="l">
-              <a:spcBef>
-                <a:spcPts val="0"/>
-              </a:spcBef>
-              <a:spcAft>
-                <a:spcPts val="1200"/>
-              </a:spcAft>
-              <a:buNone/>
-            </a:pPr>
-            <a:r>
-              <a:t/>
-            </a:r>
-            <a:endParaRPr/>
-          </a:p>
-        </p:txBody>
-      </p:sp>
-      <p:pic>
-        <p:nvPicPr>
-          <p:cNvPr id="71" name="Google Shape;71;p15"/>
-          <p:cNvPicPr preferRelativeResize="0"/>
-          <p:nvPr/>
-        </p:nvPicPr>
-        <p:blipFill>
-          <a:blip r:embed="rId3">
-            <a:alphaModFix/>
-          </a:blip>
-          <a:stretch>
-            <a:fillRect/>
-          </a:stretch>
-        </p:blipFill>
-        <p:spPr>
-          <a:xfrm>
-            <a:off x="454976" y="1017725"/>
-            <a:ext cx="7984123" cy="4125775"/>
-          </a:xfrm>
-          <a:prstGeom prst="rect">
-            <a:avLst/>
-          </a:prstGeom>
-          <a:noFill/>
-          <a:ln>
-            <a:noFill/>
-          </a:ln>
-        </p:spPr>
-      </p:pic>
-    </p:spTree>
-  </p:cSld>
-  <p:clrMapOvr>
-    <a:masterClrMapping/>
-  </p:clrMapOvr>
-</p:sld>
-</file>
-
-<file path=ppt/slides/slide4.xml><?xml version="1.0" encoding="utf-8"?>
-<p:sld xmlns:a="http://schemas.openxmlformats.org/drawingml/2006/main" xmlns:r="http://schemas.openxmlformats.org/officeDocument/2006/relationships" xmlns:mc="http://schemas.openxmlformats.org/markup-compatibility/2006" xmlns:mv="urn:schemas-microsoft-com:mac:vml" xmlns:p="http://schemas.openxmlformats.org/presentationml/2006/main" xmlns:c="http://schemas.openxmlformats.org/drawingml/2006/chart" xmlns:dgm="http://schemas.openxmlformats.org/drawingml/2006/diagram" xmlns:o="urn:schemas-microsoft-com:office:office" xmlns:v="urn:schemas-microsoft-com:vml" xmlns:pvml="urn:schemas-microsoft-com:office:powerpoint" xmlns:com="http://schemas.openxmlformats.org/drawingml/2006/compatibility" xmlns:p14="http://schemas.microsoft.com/office/powerpoint/2010/main" xmlns:p15="http://schemas.microsoft.com/office/powerpoint/2012/main" xmlns:ahyp="http://schemas.microsoft.com/office/drawing/2018/hyperlinkcolor">
-  <p:cSld>
-    <p:bg>
-      <p:bgPr>
-        <a:solidFill>
-          <a:schemeClr val="lt2"/>
-        </a:solidFill>
-      </p:bgPr>
-    </p:bg>
-    <p:spTree>
-      <p:nvGrpSpPr>
-        <p:cNvPr id="75" name="Shape 75"/>
-        <p:cNvGrpSpPr/>
-        <p:nvPr/>
-      </p:nvGrpSpPr>
-      <p:grpSpPr>
-        <a:xfrm>
-          <a:off x="0" y="0"/>
-          <a:ext cx="0" cy="0"/>
-          <a:chOff x="0" y="0"/>
-          <a:chExt cx="0" cy="0"/>
-        </a:xfrm>
-      </p:grpSpPr>
-      <p:sp>
-        <p:nvSpPr>
-          <p:cNvPr id="76" name="Google Shape;76;p16"/>
-          <p:cNvSpPr txBox="1"/>
-          <p:nvPr>
-            <p:ph idx="1" type="body"/>
-          </p:nvPr>
-        </p:nvSpPr>
-        <p:spPr>
-          <a:xfrm>
-            <a:off x="4743850" y="1152475"/>
-            <a:ext cx="4088700" cy="3416400"/>
-          </a:xfrm>
-          <a:prstGeom prst="rect">
-            <a:avLst/>
-          </a:prstGeom>
-        </p:spPr>
-        <p:txBody>
-          <a:bodyPr anchorCtr="0" anchor="t" bIns="91425" lIns="91425" spcFirstLastPara="1" rIns="91425" wrap="square" tIns="91425">
-            <a:normAutofit/>
-          </a:bodyPr>
-          <a:lstStyle/>
-          <a:p>
-            <a:pPr indent="0" lvl="0" marL="0" rtl="0" algn="l">
+            <a:pPr indent="0" lvl="0" marL="0" rtl="0" algn="ctr">
               <a:spcBef>
                 <a:spcPts val="0"/>
               </a:spcBef>
@@ -7320,103 +7374,7 @@
             </a:endParaRPr>
           </a:p>
           <a:p>
-            <a:pPr indent="0" lvl="0" marL="0" rtl="0" algn="l">
-              <a:spcBef>
-                <a:spcPts val="1200"/>
-              </a:spcBef>
-              <a:spcAft>
-                <a:spcPts val="0"/>
-              </a:spcAft>
-              <a:buNone/>
-            </a:pPr>
-            <a:r>
-              <a:rPr b="1" lang="en" sz="1050">
-                <a:solidFill>
-                  <a:srgbClr val="000000"/>
-                </a:solidFill>
-                <a:latin typeface="Cambria"/>
-                <a:ea typeface="Cambria"/>
-                <a:cs typeface="Cambria"/>
-                <a:sym typeface="Cambria"/>
-              </a:rPr>
-              <a:t>Raw:</a:t>
-            </a:r>
-            <a:endParaRPr b="1" sz="1050">
-              <a:solidFill>
-                <a:srgbClr val="000000"/>
-              </a:solidFill>
-              <a:latin typeface="Cambria"/>
-              <a:ea typeface="Cambria"/>
-              <a:cs typeface="Cambria"/>
-              <a:sym typeface="Cambria"/>
-            </a:endParaRPr>
-          </a:p>
-          <a:p>
-            <a:pPr indent="0" lvl="0" marL="0" rtl="0" algn="l">
-              <a:spcBef>
-                <a:spcPts val="1200"/>
-              </a:spcBef>
-              <a:spcAft>
-                <a:spcPts val="0"/>
-              </a:spcAft>
-              <a:buNone/>
-            </a:pPr>
-            <a:r>
-              <a:rPr b="1" lang="en" sz="1050">
-                <a:solidFill>
-                  <a:srgbClr val="000000"/>
-                </a:solidFill>
-                <a:latin typeface="Cambria"/>
-                <a:ea typeface="Cambria"/>
-                <a:cs typeface="Cambria"/>
-                <a:sym typeface="Cambria"/>
-              </a:rPr>
-              <a:t>Male     : 30% earn &gt;50K || 70% earn &lt;=50K</a:t>
-            </a:r>
-            <a:endParaRPr b="1" sz="1050">
-              <a:solidFill>
-                <a:srgbClr val="000000"/>
-              </a:solidFill>
-              <a:latin typeface="Cambria"/>
-              <a:ea typeface="Cambria"/>
-              <a:cs typeface="Cambria"/>
-              <a:sym typeface="Cambria"/>
-            </a:endParaRPr>
-          </a:p>
-          <a:p>
-            <a:pPr indent="0" lvl="0" marL="0" rtl="0" algn="l">
-              <a:spcBef>
-                <a:spcPts val="1200"/>
-              </a:spcBef>
-              <a:spcAft>
-                <a:spcPts val="0"/>
-              </a:spcAft>
-              <a:buNone/>
-            </a:pPr>
-            <a:r>
-              <a:rPr b="1" lang="en" sz="1050">
-                <a:solidFill>
-                  <a:srgbClr val="000000"/>
-                </a:solidFill>
-                <a:latin typeface="Cambria"/>
-                <a:ea typeface="Cambria"/>
-                <a:cs typeface="Cambria"/>
-                <a:sym typeface="Cambria"/>
-              </a:rPr>
-              <a:t>Female : 11% earn &gt;50K || 89% earn &lt;=50K</a:t>
-            </a:r>
-            <a:endParaRPr b="1" sz="1050">
-              <a:solidFill>
-                <a:srgbClr val="000000"/>
-              </a:solidFill>
-              <a:latin typeface="Cambria"/>
-              <a:ea typeface="Cambria"/>
-              <a:cs typeface="Cambria"/>
-              <a:sym typeface="Cambria"/>
-            </a:endParaRPr>
-          </a:p>
-          <a:p>
-            <a:pPr indent="0" lvl="0" marL="0" rtl="0" algn="l">
+            <a:pPr indent="0" lvl="0" marL="0" rtl="0" algn="ctr">
               <a:spcBef>
                 <a:spcPts val="0"/>
               </a:spcBef>
@@ -7439,7 +7397,39 @@
             </a:endParaRPr>
           </a:p>
           <a:p>
-            <a:pPr indent="0" lvl="0" marL="0" rtl="0" algn="l">
+            <a:pPr indent="0" lvl="0" marL="0" rtl="0" algn="ctr">
+              <a:spcBef>
+                <a:spcPts val="0"/>
+              </a:spcBef>
+              <a:spcAft>
+                <a:spcPts val="0"/>
+              </a:spcAft>
+              <a:buNone/>
+            </a:pPr>
+            <a:r>
+              <a:rPr b="1" lang="en" sz="1050">
+                <a:solidFill>
+                  <a:srgbClr val="000000"/>
+                </a:solidFill>
+                <a:latin typeface="Cambria"/>
+                <a:ea typeface="Cambria"/>
+                <a:cs typeface="Cambria"/>
+                <a:sym typeface="Cambria"/>
+              </a:rPr>
+              <a:t>Normalized</a:t>
+            </a:r>
+            <a:endParaRPr b="1" sz="1050">
+              <a:solidFill>
+                <a:srgbClr val="000000"/>
+              </a:solidFill>
+              <a:latin typeface="Cambria"/>
+              <a:ea typeface="Cambria"/>
+              <a:cs typeface="Cambria"/>
+              <a:sym typeface="Cambria"/>
+            </a:endParaRPr>
+          </a:p>
+          <a:p>
+            <a:pPr indent="0" lvl="0" marL="0" rtl="0" algn="ctr">
               <a:spcBef>
                 <a:spcPts val="0"/>
               </a:spcBef>
@@ -7462,7 +7452,7 @@
             </a:endParaRPr>
           </a:p>
           <a:p>
-            <a:pPr indent="0" lvl="0" marL="0" rtl="0" algn="l">
+            <a:pPr indent="0" lvl="0" marL="0" rtl="0" algn="ctr">
               <a:spcBef>
                 <a:spcPts val="0"/>
               </a:spcBef>
@@ -7481,7 +7471,31 @@
                 <a:cs typeface="Cambria"/>
                 <a:sym typeface="Cambria"/>
               </a:rPr>
-              <a:t>Normalization:</a:t>
+              <a:t>Earning &gt; 50K   : 58% are Females</a:t>
+            </a:r>
+            <a:r>
+              <a:rPr b="1" lang="en" sz="1050">
+                <a:solidFill>
+                  <a:srgbClr val="000000"/>
+                </a:solidFill>
+                <a:latin typeface="Cambria"/>
+                <a:ea typeface="Cambria"/>
+                <a:cs typeface="Cambria"/>
+                <a:sym typeface="Cambria"/>
+              </a:rPr>
+              <a:t> || </a:t>
+            </a:r>
+            <a:r>
+              <a:rPr b="1" lang="en" sz="1050">
+                <a:solidFill>
+                  <a:srgbClr val="000000"/>
+                </a:solidFill>
+                <a:latin typeface="Cambria"/>
+                <a:ea typeface="Cambria"/>
+                <a:cs typeface="Cambria"/>
+                <a:sym typeface="Cambria"/>
+              </a:rPr>
+              <a:t>42% are Males</a:t>
             </a:r>
             <a:endParaRPr b="1" sz="1050">
               <a:solidFill>
@@ -7494,7 +7508,7 @@
             </a:endParaRPr>
           </a:p>
           <a:p>
-            <a:pPr indent="0" lvl="0" marL="0" rtl="0" algn="l">
+            <a:pPr indent="0" lvl="0" marL="0" rtl="0" algn="ctr">
               <a:spcBef>
                 <a:spcPts val="0"/>
               </a:spcBef>
@@ -7517,7 +7531,7 @@
             </a:endParaRPr>
           </a:p>
           <a:p>
-            <a:pPr indent="0" lvl="0" marL="0" rtl="0" algn="l">
+            <a:pPr indent="0" lvl="0" marL="0" rtl="0" algn="ctr">
               <a:spcBef>
                 <a:spcPts val="0"/>
               </a:spcBef>
@@ -7536,7 +7550,31 @@
                 <a:cs typeface="Cambria"/>
                 <a:sym typeface="Cambria"/>
               </a:rPr>
-              <a:t>Earning &gt; 50K   : 58% are Females and 42% are Males</a:t>
+              <a:t>Earning &lt;= 50K : 28% are Females</a:t>
+            </a:r>
+            <a:r>
+              <a:rPr b="1" lang="en" sz="1050">
+                <a:solidFill>
+                  <a:srgbClr val="000000"/>
+                </a:solidFill>
+                <a:latin typeface="Cambria"/>
+                <a:ea typeface="Cambria"/>
+                <a:cs typeface="Cambria"/>
+                <a:sym typeface="Cambria"/>
+              </a:rPr>
+              <a:t> || </a:t>
+            </a:r>
+            <a:r>
+              <a:rPr b="1" lang="en" sz="1050">
+                <a:solidFill>
+                  <a:srgbClr val="000000"/>
+                </a:solidFill>
+                <a:latin typeface="Cambria"/>
+                <a:ea typeface="Cambria"/>
+                <a:cs typeface="Cambria"/>
+                <a:sym typeface="Cambria"/>
+              </a:rPr>
+              <a:t>72% are Males</a:t>
             </a:r>
             <a:endParaRPr b="1" sz="1050">
               <a:solidFill>
@@ -7561,61 +7599,6 @@
             <a:r>
               <a:t/>
             </a:r>
-            <a:endParaRPr b="1" sz="1050">
-              <a:solidFill>
-                <a:srgbClr val="000000"/>
-              </a:solidFill>
-              <a:latin typeface="Cambria"/>
-              <a:ea typeface="Cambria"/>
-              <a:cs typeface="Cambria"/>
-              <a:sym typeface="Cambria"/>
-            </a:endParaRPr>
-          </a:p>
-          <a:p>
-            <a:pPr indent="0" lvl="0" marL="0" rtl="0" algn="l">
-              <a:spcBef>
-                <a:spcPts val="0"/>
-              </a:spcBef>
-              <a:spcAft>
-                <a:spcPts val="0"/>
-              </a:spcAft>
-              <a:buNone/>
-            </a:pPr>
-            <a:r>
-              <a:rPr b="1" lang="en" sz="1050">
-                <a:solidFill>
-                  <a:srgbClr val="000000"/>
-                </a:solidFill>
-                <a:latin typeface="Cambria"/>
-                <a:ea typeface="Cambria"/>
-                <a:cs typeface="Cambria"/>
-                <a:sym typeface="Cambria"/>
-              </a:rPr>
-              <a:t>Earning =&lt; 50K : 28% are Females and 72% are Males</a:t>
-            </a:r>
-            <a:endParaRPr b="1" sz="1050">
-              <a:solidFill>
-                <a:srgbClr val="000000"/>
-              </a:solidFill>
-              <a:latin typeface="Cambria"/>
-              <a:ea typeface="Cambria"/>
-              <a:cs typeface="Cambria"/>
-              <a:sym typeface="Cambria"/>
-            </a:endParaRPr>
-          </a:p>
-          <a:p>
-            <a:pPr indent="0" lvl="0" marL="0" rtl="0" algn="l">
-              <a:spcBef>
-                <a:spcPts val="0"/>
-              </a:spcBef>
-              <a:spcAft>
-                <a:spcPts val="0"/>
-              </a:spcAft>
-              <a:buNone/>
-            </a:pPr>
-            <a:r>
-              <a:t/>
-            </a:r>
             <a:endParaRPr sz="1050">
               <a:solidFill>
                 <a:srgbClr val="000000"/>
@@ -7641,7 +7624,7 @@
       </p:sp>
       <p:pic>
         <p:nvPicPr>
-          <p:cNvPr id="77" name="Google Shape;77;p16"/>
+          <p:cNvPr id="69" name="Google Shape;69;p15"/>
           <p:cNvPicPr preferRelativeResize="0"/>
           <p:nvPr/>
         </p:nvPicPr>
@@ -7675,19 +7658,19 @@
 </p:sld>
 </file>
 
-<file path=ppt/slides/slide5.xml><?xml version="1.0" encoding="utf-8"?>
+<file path=ppt/slides/slide4.xml><?xml version="1.0" encoding="utf-8"?>
 <p:sld xmlns:a="http://schemas.openxmlformats.org/drawingml/2006/main" xmlns:r="http://schemas.openxmlformats.org/officeDocument/2006/relationships" xmlns:mc="http://schemas.openxmlformats.org/markup-compatibility/2006" xmlns:mv="urn:schemas-microsoft-com:mac:vml" xmlns:p="http://schemas.openxmlformats.org/presentationml/2006/main" xmlns:c="http://schemas.openxmlformats.org/drawingml/2006/chart" xmlns:dgm="http://schemas.openxmlformats.org/drawingml/2006/diagram" xmlns:o="urn:schemas-microsoft-com:office:office" xmlns:v="urn:schemas-microsoft-com:vml" xmlns:pvml="urn:schemas-microsoft-com:office:powerpoint" xmlns:com="http://schemas.openxmlformats.org/drawingml/2006/compatibility" xmlns:p14="http://schemas.microsoft.com/office/powerpoint/2010/main" xmlns:p15="http://schemas.microsoft.com/office/powerpoint/2012/main" xmlns:ahyp="http://schemas.microsoft.com/office/drawing/2018/hyperlinkcolor">
   <p:cSld>
     <p:bg>
       <p:bgPr>
         <a:solidFill>
-          <a:schemeClr val="lt2"/>
+          <a:schemeClr val="dk1"/>
         </a:solidFill>
       </p:bgPr>
     </p:bg>
     <p:spTree>
       <p:nvGrpSpPr>
-        <p:cNvPr id="81" name="Shape 81"/>
+        <p:cNvPr id="73" name="Shape 73"/>
         <p:cNvGrpSpPr/>
         <p:nvPr/>
       </p:nvGrpSpPr>
@@ -7701,7 +7684,7 @@
       </p:grpSpPr>
       <p:sp>
         <p:nvSpPr>
-          <p:cNvPr id="82" name="Google Shape;82;p17"/>
+          <p:cNvPr id="74" name="Google Shape;74;p16"/>
           <p:cNvSpPr txBox="1"/>
           <p:nvPr>
             <p:ph type="title"/>
@@ -7738,48 +7721,9 @@
           </a:p>
         </p:txBody>
       </p:sp>
-      <p:sp>
-        <p:nvSpPr>
-          <p:cNvPr id="83" name="Google Shape;83;p17"/>
-          <p:cNvSpPr txBox="1"/>
-          <p:nvPr>
-            <p:ph idx="1" type="body"/>
-          </p:nvPr>
-        </p:nvSpPr>
-        <p:spPr>
-          <a:xfrm>
-            <a:off x="311700" y="1152475"/>
-            <a:ext cx="8520600" cy="3416400"/>
-          </a:xfrm>
-          <a:prstGeom prst="rect">
-            <a:avLst/>
-          </a:prstGeom>
-        </p:spPr>
-        <p:txBody>
-          <a:bodyPr anchorCtr="0" anchor="t" bIns="91425" lIns="91425" spcFirstLastPara="1" rIns="91425" wrap="square" tIns="91425">
-            <a:normAutofit/>
-          </a:bodyPr>
-          <a:lstStyle/>
-          <a:p>
-            <a:pPr indent="0" lvl="0" marL="0" rtl="0" algn="l">
-              <a:spcBef>
-                <a:spcPts val="0"/>
-              </a:spcBef>
-              <a:spcAft>
-                <a:spcPts val="1200"/>
-              </a:spcAft>
-              <a:buNone/>
-            </a:pPr>
-            <a:r>
-              <a:t/>
-            </a:r>
-            <a:endParaRPr/>
-          </a:p>
-        </p:txBody>
-      </p:sp>
       <p:pic>
         <p:nvPicPr>
-          <p:cNvPr id="84" name="Google Shape;84;p17"/>
+          <p:cNvPr id="75" name="Google Shape;75;p16"/>
           <p:cNvPicPr preferRelativeResize="0"/>
           <p:nvPr/>
         </p:nvPicPr>
@@ -7807,7 +7751,7 @@
       </p:pic>
       <p:pic>
         <p:nvPicPr>
-          <p:cNvPr id="85" name="Google Shape;85;p17"/>
+          <p:cNvPr id="76" name="Google Shape;76;p16"/>
           <p:cNvPicPr preferRelativeResize="0"/>
           <p:nvPr/>
         </p:nvPicPr>
@@ -7841,19 +7785,19 @@
 </p:sld>
 </file>
 
-<file path=ppt/slides/slide6.xml><?xml version="1.0" encoding="utf-8"?>
+<file path=ppt/slides/slide5.xml><?xml version="1.0" encoding="utf-8"?>
 <p:sld xmlns:a="http://schemas.openxmlformats.org/drawingml/2006/main" xmlns:r="http://schemas.openxmlformats.org/officeDocument/2006/relationships" xmlns:mc="http://schemas.openxmlformats.org/markup-compatibility/2006" xmlns:mv="urn:schemas-microsoft-com:mac:vml" xmlns:p="http://schemas.openxmlformats.org/presentationml/2006/main" xmlns:c="http://schemas.openxmlformats.org/drawingml/2006/chart" xmlns:dgm="http://schemas.openxmlformats.org/drawingml/2006/diagram" xmlns:o="urn:schemas-microsoft-com:office:office" xmlns:v="urn:schemas-microsoft-com:vml" xmlns:pvml="urn:schemas-microsoft-com:office:powerpoint" xmlns:com="http://schemas.openxmlformats.org/drawingml/2006/compatibility" xmlns:p14="http://schemas.microsoft.com/office/powerpoint/2010/main" xmlns:p15="http://schemas.microsoft.com/office/powerpoint/2012/main" xmlns:ahyp="http://schemas.microsoft.com/office/drawing/2018/hyperlinkcolor">
   <p:cSld>
     <p:bg>
       <p:bgPr>
         <a:solidFill>
-          <a:schemeClr val="lt2"/>
+          <a:schemeClr val="dk1"/>
         </a:solidFill>
       </p:bgPr>
     </p:bg>
     <p:spTree>
       <p:nvGrpSpPr>
-        <p:cNvPr id="89" name="Shape 89"/>
+        <p:cNvPr id="80" name="Shape 80"/>
         <p:cNvGrpSpPr/>
         <p:nvPr/>
       </p:nvGrpSpPr>
@@ -7867,7 +7811,7 @@
       </p:grpSpPr>
       <p:sp>
         <p:nvSpPr>
-          <p:cNvPr id="90" name="Google Shape;90;p18"/>
+          <p:cNvPr id="81" name="Google Shape;81;p17"/>
           <p:cNvSpPr txBox="1"/>
           <p:nvPr>
             <p:ph type="title"/>
@@ -7906,7 +7850,7 @@
       </p:sp>
       <p:sp>
         <p:nvSpPr>
-          <p:cNvPr id="91" name="Google Shape;91;p18"/>
+          <p:cNvPr id="82" name="Google Shape;82;p17"/>
           <p:cNvSpPr txBox="1"/>
           <p:nvPr>
             <p:ph idx="1" type="body"/>
@@ -8001,7 +7945,31 @@
                 <a:cs typeface="Cambria"/>
                 <a:sym typeface="Cambria"/>
               </a:rPr>
-              <a:t>Among Natives        :  24% earn &gt;50K and 76% earn &lt;=50K</a:t>
+              <a:t>Among Natives        :  24% earn &gt;50K</a:t>
+            </a:r>
+            <a:r>
+              <a:rPr b="1" lang="en" sz="1050">
+                <a:solidFill>
+                  <a:srgbClr val="000000"/>
+                </a:solidFill>
+                <a:latin typeface="Cambria"/>
+                <a:ea typeface="Cambria"/>
+                <a:cs typeface="Cambria"/>
+                <a:sym typeface="Cambria"/>
+              </a:rPr>
+              <a:t> || </a:t>
+            </a:r>
+            <a:r>
+              <a:rPr b="1" lang="en" sz="1050">
+                <a:solidFill>
+                  <a:srgbClr val="000000"/>
+                </a:solidFill>
+                <a:latin typeface="Cambria"/>
+                <a:ea typeface="Cambria"/>
+                <a:cs typeface="Cambria"/>
+                <a:sym typeface="Cambria"/>
+              </a:rPr>
+              <a:t>76% earn &lt;=50K</a:t>
             </a:r>
             <a:endParaRPr b="1" sz="1050">
               <a:solidFill>
@@ -8033,7 +8001,31 @@
                 <a:cs typeface="Cambria"/>
                 <a:sym typeface="Cambria"/>
               </a:rPr>
-              <a:t>Among Foreigners  :  19% earn &gt;50K  and 81% earn &lt;=50K</a:t>
+              <a:t>Among Foreigners  :  19% earn &gt;50K</a:t>
+            </a:r>
+            <a:r>
+              <a:rPr b="1" lang="en" sz="1050">
+                <a:solidFill>
+                  <a:srgbClr val="000000"/>
+                </a:solidFill>
+                <a:latin typeface="Cambria"/>
+                <a:ea typeface="Cambria"/>
+                <a:cs typeface="Cambria"/>
+                <a:sym typeface="Cambria"/>
+              </a:rPr>
+              <a:t> || </a:t>
+            </a:r>
+            <a:r>
+              <a:rPr b="1" lang="en" sz="1050">
+                <a:solidFill>
+                  <a:srgbClr val="000000"/>
+                </a:solidFill>
+                <a:latin typeface="Cambria"/>
+                <a:ea typeface="Cambria"/>
+                <a:cs typeface="Cambria"/>
+                <a:sym typeface="Cambria"/>
+              </a:rPr>
+              <a:t>81% earn &lt;=50K</a:t>
             </a:r>
             <a:endParaRPr b="1" sz="1050">
               <a:solidFill>
@@ -8281,19 +8273,19 @@
 </p:sld>
 </file>
 
-<file path=ppt/slides/slide7.xml><?xml version="1.0" encoding="utf-8"?>
+<file path=ppt/slides/slide6.xml><?xml version="1.0" encoding="utf-8"?>
 <p:sld xmlns:a="http://schemas.openxmlformats.org/drawingml/2006/main" xmlns:r="http://schemas.openxmlformats.org/officeDocument/2006/relationships" xmlns:mc="http://schemas.openxmlformats.org/markup-compatibility/2006" xmlns:mv="urn:schemas-microsoft-com:mac:vml" xmlns:p="http://schemas.openxmlformats.org/presentationml/2006/main" xmlns:c="http://schemas.openxmlformats.org/drawingml/2006/chart" xmlns:dgm="http://schemas.openxmlformats.org/drawingml/2006/diagram" xmlns:o="urn:schemas-microsoft-com:office:office" xmlns:v="urn:schemas-microsoft-com:vml" xmlns:pvml="urn:schemas-microsoft-com:office:powerpoint" xmlns:com="http://schemas.openxmlformats.org/drawingml/2006/compatibility" xmlns:p14="http://schemas.microsoft.com/office/powerpoint/2010/main" xmlns:p15="http://schemas.microsoft.com/office/powerpoint/2012/main" xmlns:ahyp="http://schemas.microsoft.com/office/drawing/2018/hyperlinkcolor">
   <p:cSld>
     <p:bg>
       <p:bgPr>
         <a:solidFill>
-          <a:schemeClr val="lt2"/>
+          <a:schemeClr val="dk1"/>
         </a:solidFill>
       </p:bgPr>
     </p:bg>
     <p:spTree>
       <p:nvGrpSpPr>
-        <p:cNvPr id="95" name="Shape 95"/>
+        <p:cNvPr id="86" name="Shape 86"/>
         <p:cNvGrpSpPr/>
         <p:nvPr/>
       </p:nvGrpSpPr>
@@ -8307,7 +8299,7 @@
       </p:grpSpPr>
       <p:sp>
         <p:nvSpPr>
-          <p:cNvPr id="96" name="Google Shape;96;p19"/>
+          <p:cNvPr id="87" name="Google Shape;87;p18"/>
           <p:cNvSpPr txBox="1"/>
           <p:nvPr>
             <p:ph type="title"/>
@@ -8344,48 +8336,9 @@
           </a:p>
         </p:txBody>
       </p:sp>
-      <p:sp>
-        <p:nvSpPr>
-          <p:cNvPr id="97" name="Google Shape;97;p19"/>
-          <p:cNvSpPr txBox="1"/>
-          <p:nvPr>
-            <p:ph idx="1" type="body"/>
-          </p:nvPr>
-        </p:nvSpPr>
-        <p:spPr>
-          <a:xfrm>
-            <a:off x="311700" y="1152475"/>
-            <a:ext cx="8520600" cy="3416400"/>
-          </a:xfrm>
-          <a:prstGeom prst="rect">
-            <a:avLst/>
-          </a:prstGeom>
-        </p:spPr>
-        <p:txBody>
-          <a:bodyPr anchorCtr="0" anchor="t" bIns="91425" lIns="91425" spcFirstLastPara="1" rIns="91425" wrap="square" tIns="91425">
-            <a:normAutofit/>
-          </a:bodyPr>
-          <a:lstStyle/>
-          <a:p>
-            <a:pPr indent="0" lvl="0" marL="0" rtl="0" algn="l">
-              <a:spcBef>
-                <a:spcPts val="0"/>
-              </a:spcBef>
-              <a:spcAft>
-                <a:spcPts val="1200"/>
-              </a:spcAft>
-              <a:buNone/>
-            </a:pPr>
-            <a:r>
-              <a:t/>
-            </a:r>
-            <a:endParaRPr/>
-          </a:p>
-        </p:txBody>
-      </p:sp>
       <p:pic>
         <p:nvPicPr>
-          <p:cNvPr id="98" name="Google Shape;98;p19"/>
+          <p:cNvPr id="88" name="Google Shape;88;p18"/>
           <p:cNvPicPr preferRelativeResize="0"/>
           <p:nvPr/>
         </p:nvPicPr>
@@ -8419,19 +8372,19 @@
 </p:sld>
 </file>
 
-<file path=ppt/slides/slide8.xml><?xml version="1.0" encoding="utf-8"?>
+<file path=ppt/slides/slide7.xml><?xml version="1.0" encoding="utf-8"?>
 <p:sld xmlns:a="http://schemas.openxmlformats.org/drawingml/2006/main" xmlns:r="http://schemas.openxmlformats.org/officeDocument/2006/relationships" xmlns:mc="http://schemas.openxmlformats.org/markup-compatibility/2006" xmlns:mv="urn:schemas-microsoft-com:mac:vml" xmlns:p="http://schemas.openxmlformats.org/presentationml/2006/main" xmlns:c="http://schemas.openxmlformats.org/drawingml/2006/chart" xmlns:dgm="http://schemas.openxmlformats.org/drawingml/2006/diagram" xmlns:o="urn:schemas-microsoft-com:office:office" xmlns:v="urn:schemas-microsoft-com:vml" xmlns:pvml="urn:schemas-microsoft-com:office:powerpoint" xmlns:com="http://schemas.openxmlformats.org/drawingml/2006/compatibility" xmlns:p14="http://schemas.microsoft.com/office/powerpoint/2010/main" xmlns:p15="http://schemas.microsoft.com/office/powerpoint/2012/main" xmlns:ahyp="http://schemas.microsoft.com/office/drawing/2018/hyperlinkcolor">
   <p:cSld>
     <p:bg>
       <p:bgPr>
         <a:solidFill>
-          <a:schemeClr val="lt2"/>
+          <a:schemeClr val="dk1"/>
         </a:solidFill>
       </p:bgPr>
     </p:bg>
     <p:spTree>
       <p:nvGrpSpPr>
-        <p:cNvPr id="102" name="Shape 102"/>
+        <p:cNvPr id="92" name="Shape 92"/>
         <p:cNvGrpSpPr/>
         <p:nvPr/>
       </p:nvGrpSpPr>
@@ -8445,7 +8398,7 @@
       </p:grpSpPr>
       <p:sp>
         <p:nvSpPr>
-          <p:cNvPr id="103" name="Google Shape;103;p20"/>
+          <p:cNvPr id="93" name="Google Shape;93;p19"/>
           <p:cNvSpPr txBox="1"/>
           <p:nvPr>
             <p:ph type="title"/>
@@ -8482,48 +8435,9 @@
           </a:p>
         </p:txBody>
       </p:sp>
-      <p:sp>
-        <p:nvSpPr>
-          <p:cNvPr id="104" name="Google Shape;104;p20"/>
-          <p:cNvSpPr txBox="1"/>
-          <p:nvPr>
-            <p:ph idx="1" type="body"/>
-          </p:nvPr>
-        </p:nvSpPr>
-        <p:spPr>
-          <a:xfrm>
-            <a:off x="311700" y="1152475"/>
-            <a:ext cx="8520600" cy="3416400"/>
-          </a:xfrm>
-          <a:prstGeom prst="rect">
-            <a:avLst/>
-          </a:prstGeom>
-        </p:spPr>
-        <p:txBody>
-          <a:bodyPr anchorCtr="0" anchor="t" bIns="91425" lIns="91425" spcFirstLastPara="1" rIns="91425" wrap="square" tIns="91425">
-            <a:normAutofit/>
-          </a:bodyPr>
-          <a:lstStyle/>
-          <a:p>
-            <a:pPr indent="0" lvl="0" marL="0" rtl="0" algn="l">
-              <a:spcBef>
-                <a:spcPts val="0"/>
-              </a:spcBef>
-              <a:spcAft>
-                <a:spcPts val="1200"/>
-              </a:spcAft>
-              <a:buNone/>
-            </a:pPr>
-            <a:r>
-              <a:t/>
-            </a:r>
-            <a:endParaRPr/>
-          </a:p>
-        </p:txBody>
-      </p:sp>
       <p:pic>
         <p:nvPicPr>
-          <p:cNvPr id="105" name="Google Shape;105;p20"/>
+          <p:cNvPr id="94" name="Google Shape;94;p19"/>
           <p:cNvPicPr preferRelativeResize="0"/>
           <p:nvPr/>
         </p:nvPicPr>
@@ -8557,19 +8471,19 @@
 </p:sld>
 </file>
 
-<file path=ppt/slides/slide9.xml><?xml version="1.0" encoding="utf-8"?>
+<file path=ppt/slides/slide8.xml><?xml version="1.0" encoding="utf-8"?>
 <p:sld xmlns:a="http://schemas.openxmlformats.org/drawingml/2006/main" xmlns:r="http://schemas.openxmlformats.org/officeDocument/2006/relationships" xmlns:mc="http://schemas.openxmlformats.org/markup-compatibility/2006" xmlns:mv="urn:schemas-microsoft-com:mac:vml" xmlns:p="http://schemas.openxmlformats.org/presentationml/2006/main" xmlns:c="http://schemas.openxmlformats.org/drawingml/2006/chart" xmlns:dgm="http://schemas.openxmlformats.org/drawingml/2006/diagram" xmlns:o="urn:schemas-microsoft-com:office:office" xmlns:v="urn:schemas-microsoft-com:vml" xmlns:pvml="urn:schemas-microsoft-com:office:powerpoint" xmlns:com="http://schemas.openxmlformats.org/drawingml/2006/compatibility" xmlns:p14="http://schemas.microsoft.com/office/powerpoint/2010/main" xmlns:p15="http://schemas.microsoft.com/office/powerpoint/2012/main" xmlns:ahyp="http://schemas.microsoft.com/office/drawing/2018/hyperlinkcolor">
   <p:cSld>
     <p:bg>
       <p:bgPr>
         <a:solidFill>
-          <a:schemeClr val="lt2"/>
+          <a:schemeClr val="dk1"/>
         </a:solidFill>
       </p:bgPr>
     </p:bg>
     <p:spTree>
       <p:nvGrpSpPr>
-        <p:cNvPr id="109" name="Shape 109"/>
+        <p:cNvPr id="98" name="Shape 98"/>
         <p:cNvGrpSpPr/>
         <p:nvPr/>
       </p:nvGrpSpPr>
@@ -8583,7 +8497,7 @@
       </p:grpSpPr>
       <p:sp>
         <p:nvSpPr>
-          <p:cNvPr id="110" name="Google Shape;110;p21"/>
+          <p:cNvPr id="99" name="Google Shape;99;p20"/>
           <p:cNvSpPr txBox="1"/>
           <p:nvPr>
             <p:ph type="title"/>
@@ -8620,48 +8534,9 @@
           </a:p>
         </p:txBody>
       </p:sp>
-      <p:sp>
-        <p:nvSpPr>
-          <p:cNvPr id="111" name="Google Shape;111;p21"/>
-          <p:cNvSpPr txBox="1"/>
-          <p:nvPr>
-            <p:ph idx="1" type="body"/>
-          </p:nvPr>
-        </p:nvSpPr>
-        <p:spPr>
-          <a:xfrm>
-            <a:off x="311700" y="1152475"/>
-            <a:ext cx="8520600" cy="3416400"/>
-          </a:xfrm>
-          <a:prstGeom prst="rect">
-            <a:avLst/>
-          </a:prstGeom>
-        </p:spPr>
-        <p:txBody>
-          <a:bodyPr anchorCtr="0" anchor="t" bIns="91425" lIns="91425" spcFirstLastPara="1" rIns="91425" wrap="square" tIns="91425">
-            <a:normAutofit/>
-          </a:bodyPr>
-          <a:lstStyle/>
-          <a:p>
-            <a:pPr indent="0" lvl="0" marL="0" rtl="0" algn="l">
-              <a:spcBef>
-                <a:spcPts val="0"/>
-              </a:spcBef>
-              <a:spcAft>
-                <a:spcPts val="1200"/>
-              </a:spcAft>
-              <a:buNone/>
-            </a:pPr>
-            <a:r>
-              <a:t/>
-            </a:r>
-            <a:endParaRPr/>
-          </a:p>
-        </p:txBody>
-      </p:sp>
       <p:pic>
         <p:nvPicPr>
-          <p:cNvPr id="112" name="Google Shape;112;p21"/>
+          <p:cNvPr id="100" name="Google Shape;100;p20"/>
           <p:cNvPicPr preferRelativeResize="0"/>
           <p:nvPr/>
         </p:nvPicPr>
@@ -8695,7 +8570,385 @@
 </p:sld>
 </file>
 
+<file path=ppt/slides/slide9.xml><?xml version="1.0" encoding="utf-8"?>
+<p:sld xmlns:a="http://schemas.openxmlformats.org/drawingml/2006/main" xmlns:r="http://schemas.openxmlformats.org/officeDocument/2006/relationships" xmlns:mc="http://schemas.openxmlformats.org/markup-compatibility/2006" xmlns:mv="urn:schemas-microsoft-com:mac:vml" xmlns:p="http://schemas.openxmlformats.org/presentationml/2006/main" xmlns:c="http://schemas.openxmlformats.org/drawingml/2006/chart" xmlns:dgm="http://schemas.openxmlformats.org/drawingml/2006/diagram" xmlns:o="urn:schemas-microsoft-com:office:office" xmlns:v="urn:schemas-microsoft-com:vml" xmlns:pvml="urn:schemas-microsoft-com:office:powerpoint" xmlns:com="http://schemas.openxmlformats.org/drawingml/2006/compatibility" xmlns:p14="http://schemas.microsoft.com/office/powerpoint/2010/main" xmlns:p15="http://schemas.microsoft.com/office/powerpoint/2012/main" xmlns:ahyp="http://schemas.microsoft.com/office/drawing/2018/hyperlinkcolor">
+  <p:cSld>
+    <p:bg>
+      <p:bgPr>
+        <a:solidFill>
+          <a:schemeClr val="dk1"/>
+        </a:solidFill>
+      </p:bgPr>
+    </p:bg>
+    <p:spTree>
+      <p:nvGrpSpPr>
+        <p:cNvPr id="104" name="Shape 104"/>
+        <p:cNvGrpSpPr/>
+        <p:nvPr/>
+      </p:nvGrpSpPr>
+      <p:grpSpPr>
+        <a:xfrm>
+          <a:off x="0" y="0"/>
+          <a:ext cx="0" cy="0"/>
+          <a:chOff x="0" y="0"/>
+          <a:chExt cx="0" cy="0"/>
+        </a:xfrm>
+      </p:grpSpPr>
+      <p:sp>
+        <p:nvSpPr>
+          <p:cNvPr id="105" name="Google Shape;105;p21"/>
+          <p:cNvSpPr txBox="1"/>
+          <p:nvPr>
+            <p:ph type="title"/>
+          </p:nvPr>
+        </p:nvSpPr>
+        <p:spPr>
+          <a:xfrm>
+            <a:off x="311700" y="445025"/>
+            <a:ext cx="8520600" cy="572700"/>
+          </a:xfrm>
+          <a:prstGeom prst="rect">
+            <a:avLst/>
+          </a:prstGeom>
+        </p:spPr>
+        <p:txBody>
+          <a:bodyPr anchorCtr="0" anchor="t" bIns="91425" lIns="91425" spcFirstLastPara="1" rIns="91425" wrap="square" tIns="91425">
+            <a:normAutofit fontScale="90000"/>
+          </a:bodyPr>
+          <a:lstStyle/>
+          <a:p>
+            <a:pPr indent="0" lvl="0" marL="0" rtl="0" algn="l">
+              <a:spcBef>
+                <a:spcPts val="0"/>
+              </a:spcBef>
+              <a:spcAft>
+                <a:spcPts val="0"/>
+              </a:spcAft>
+              <a:buNone/>
+            </a:pPr>
+            <a:r>
+              <a:t/>
+            </a:r>
+            <a:endParaRPr/>
+          </a:p>
+        </p:txBody>
+      </p:sp>
+      <p:pic>
+        <p:nvPicPr>
+          <p:cNvPr id="106" name="Google Shape;106;p21"/>
+          <p:cNvPicPr preferRelativeResize="0"/>
+          <p:nvPr/>
+        </p:nvPicPr>
+        <p:blipFill>
+          <a:blip r:embed="rId3">
+            <a:alphaModFix/>
+          </a:blip>
+          <a:stretch>
+            <a:fillRect/>
+          </a:stretch>
+        </p:blipFill>
+        <p:spPr>
+          <a:xfrm>
+            <a:off x="1332763" y="1152473"/>
+            <a:ext cx="6478479" cy="3416399"/>
+          </a:xfrm>
+          <a:prstGeom prst="rect">
+            <a:avLst/>
+          </a:prstGeom>
+          <a:noFill/>
+          <a:ln>
+            <a:noFill/>
+          </a:ln>
+        </p:spPr>
+      </p:pic>
+    </p:spTree>
+  </p:cSld>
+  <p:clrMapOvr>
+    <a:masterClrMapping/>
+  </p:clrMapOvr>
+</p:sld>
+</file>
+
 <file path=ppt/theme/theme1.xml><?xml version="1.0" encoding="utf-8"?>
+<a:theme xmlns:a="http://schemas.openxmlformats.org/drawingml/2006/main" xmlns:r="http://schemas.openxmlformats.org/officeDocument/2006/relationships" name="Simple Dark">
+  <a:themeElements>
+    <a:clrScheme name="Simple Dark">
+      <a:dk1>
+        <a:srgbClr val="FFFFFF"/>
+      </a:dk1>
+      <a:lt1>
+        <a:srgbClr val="212121"/>
+      </a:lt1>
+      <a:dk2>
+        <a:srgbClr val="303030"/>
+      </a:dk2>
+      <a:lt2>
+        <a:srgbClr val="ADADAD"/>
+      </a:lt2>
+      <a:accent1>
+        <a:srgbClr val="009688"/>
+      </a:accent1>
+      <a:accent2>
+        <a:srgbClr val="EEEEEE"/>
+      </a:accent2>
+      <a:accent3>
+        <a:srgbClr val="78909C"/>
+      </a:accent3>
+      <a:accent4>
+        <a:srgbClr val="FFAB40"/>
+      </a:accent4>
+      <a:accent5>
+        <a:srgbClr val="4DD0E1"/>
+      </a:accent5>
+      <a:accent6>
+        <a:srgbClr val="EEFF41"/>
+      </a:accent6>
+      <a:hlink>
+        <a:srgbClr val="4DD0E1"/>
+      </a:hlink>
+      <a:folHlink>
+        <a:srgbClr val="4DD0E1"/>
+      </a:folHlink>
+    </a:clrScheme>
+    <a:fontScheme name="Office">
+      <a:majorFont>
+        <a:latin typeface="Arial"/>
+        <a:ea typeface=""/>
+        <a:cs typeface=""/>
+        <a:font script="Jpan" typeface="ＭＳ Ｐゴシック"/>
+        <a:font script="Hang" typeface="맑은 고딕"/>
+        <a:font script="Hans" typeface="宋体"/>
+        <a:font script="Hant" typeface="新細明體"/>
+        <a:font script="Arab" typeface="Times New Roman"/>
+        <a:font script="Hebr" typeface="Times New Roman"/>
+        <a:font script="Thai" typeface="Angsana New"/>
+        <a:font script="Ethi" typeface="Nyala"/>
+        <a:font script="Beng" typeface="Vrinda"/>
+        <a:font script="Gujr" typeface="Shruti"/>
+        <a:font script="Khmr" typeface="MoolBoran"/>
+        <a:font script="Knda" typeface="Tunga"/>
+        <a:font script="Guru" typeface="Raavi"/>
+        <a:font script="Cans" typeface="Euphemia"/>
+        <a:font script="Cher" typeface="Plantagenet Cherokee"/>
+        <a:font script="Yiii" typeface="Microsoft Yi Baiti"/>
+        <a:font script="Tibt" typeface="Microsoft Himalaya"/>
+        <a:font script="Thaa" typeface="MV Boli"/>
+        <a:font script="Deva" typeface="Mangal"/>
+        <a:font script="Telu" typeface="Gautami"/>
+        <a:font script="Taml" typeface="Latha"/>
+        <a:font script="Syrc" typeface="Estrangelo Edessa"/>
+        <a:font script="Orya" typeface="Kalinga"/>
+        <a:font script="Mlym" typeface="Kartika"/>
+        <a:font script="Laoo" typeface="DokChampa"/>
+        <a:font script="Sinh" typeface="Iskoola Pota"/>
+        <a:font script="Mong" typeface="Mongolian Baiti"/>
+        <a:font script="Viet" typeface="Times New Roman"/>
+        <a:font script="Uigh" typeface="Microsoft Uighur"/>
+        <a:font script="Geor" typeface="Sylfaen"/>
+      </a:majorFont>
+      <a:minorFont>
+        <a:latin typeface="Arial"/>
+        <a:ea typeface=""/>
+        <a:cs typeface=""/>
+        <a:font script="Jpan" typeface="ＭＳ Ｐゴシック"/>
+        <a:font script="Hang" typeface="맑은 고딕"/>
+        <a:font script="Hans" typeface="宋体"/>
+        <a:font script="Hant" typeface="新細明體"/>
+        <a:font script="Arab" typeface="Arial"/>
+        <a:font script="Hebr" typeface="Arial"/>
+        <a:font script="Thai" typeface="Cordia New"/>
+        <a:font script="Ethi" typeface="Nyala"/>
+        <a:font script="Beng" typeface="Vrinda"/>
+        <a:font script="Gujr" typeface="Shruti"/>
+        <a:font script="Khmr" typeface="DaunPenh"/>
+        <a:font script="Knda" typeface="Tunga"/>
+        <a:font script="Guru" typeface="Raavi"/>
+        <a:font script="Cans" typeface="Euphemia"/>
+        <a:font script="Cher" typeface="Plantagenet Cherokee"/>
+        <a:font script="Yiii" typeface="Microsoft Yi Baiti"/>
+        <a:font script="Tibt" typeface="Microsoft Himalaya"/>
+        <a:font script="Thaa" typeface="MV Boli"/>
+        <a:font script="Deva" typeface="Mangal"/>
+        <a:font script="Telu" typeface="Gautami"/>
+        <a:font script="Taml" typeface="Latha"/>
+        <a:font script="Syrc" typeface="Estrangelo Edessa"/>
+        <a:font script="Orya" typeface="Kalinga"/>
+        <a:font script="Mlym" typeface="Kartika"/>
+        <a:font script="Laoo" typeface="DokChampa"/>
+        <a:font script="Sinh" typeface="Iskoola Pota"/>
+        <a:font script="Mong" typeface="Mongolian Baiti"/>
+        <a:font script="Viet" typeface="Arial"/>
+        <a:font script="Uigh" typeface="Microsoft Uighur"/>
+        <a:font script="Geor" typeface="Sylfaen"/>
+      </a:minorFont>
+    </a:fontScheme>
+    <a:fmtScheme name="Office">
+      <a:fillStyleLst>
+        <a:solidFill>
+          <a:schemeClr val="phClr"/>
+        </a:solidFill>
+        <a:gradFill rotWithShape="1">
+          <a:gsLst>
+            <a:gs pos="0">
+              <a:schemeClr val="phClr">
+                <a:tint val="50000"/>
+                <a:satMod val="300000"/>
+              </a:schemeClr>
+            </a:gs>
+            <a:gs pos="35000">
+              <a:schemeClr val="phClr">
+                <a:tint val="37000"/>
+                <a:satMod val="300000"/>
+              </a:schemeClr>
+            </a:gs>
+            <a:gs pos="100000">
+              <a:schemeClr val="phClr">
+                <a:tint val="15000"/>
+                <a:satMod val="350000"/>
+              </a:schemeClr>
+            </a:gs>
+          </a:gsLst>
+          <a:lin ang="16200000" scaled="1"/>
+        </a:gradFill>
+        <a:gradFill rotWithShape="1">
+          <a:gsLst>
+            <a:gs pos="0">
+              <a:schemeClr val="phClr">
+                <a:tint val="100000"/>
+                <a:shade val="100000"/>
+                <a:satMod val="130000"/>
+              </a:schemeClr>
+            </a:gs>
+            <a:gs pos="100000">
+              <a:schemeClr val="phClr">
+                <a:tint val="50000"/>
+                <a:shade val="100000"/>
+                <a:satMod val="350000"/>
+              </a:schemeClr>
+            </a:gs>
+          </a:gsLst>
+          <a:lin ang="16200000" scaled="0"/>
+        </a:gradFill>
+      </a:fillStyleLst>
+      <a:lnStyleLst>
+        <a:ln w="9525" cap="flat" cmpd="sng" algn="ctr">
+          <a:solidFill>
+            <a:schemeClr val="phClr">
+              <a:shade val="95000"/>
+              <a:satMod val="105000"/>
+            </a:schemeClr>
+          </a:solidFill>
+          <a:prstDash val="solid"/>
+        </a:ln>
+        <a:ln w="25400" cap="flat" cmpd="sng" algn="ctr">
+          <a:solidFill>
+            <a:schemeClr val="phClr"/>
+          </a:solidFill>
+          <a:prstDash val="solid"/>
+        </a:ln>
+        <a:ln w="38100" cap="flat" cmpd="sng" algn="ctr">
+          <a:solidFill>
+            <a:schemeClr val="phClr"/>
+          </a:solidFill>
+          <a:prstDash val="solid"/>
+        </a:ln>
+      </a:lnStyleLst>
+      <a:effectStyleLst>
+        <a:effectStyle>
+          <a:effectLst>
+            <a:outerShdw blurRad="40000" dist="20000" dir="5400000" rotWithShape="0">
+              <a:srgbClr val="000000">
+                <a:alpha val="38000"/>
+              </a:srgbClr>
+            </a:outerShdw>
+          </a:effectLst>
+        </a:effectStyle>
+        <a:effectStyle>
+          <a:effectLst>
+            <a:outerShdw blurRad="40000" dist="23000" dir="5400000" rotWithShape="0">
+              <a:srgbClr val="000000">
+                <a:alpha val="35000"/>
+              </a:srgbClr>
+            </a:outerShdw>
+          </a:effectLst>
+        </a:effectStyle>
+        <a:effectStyle>
+          <a:effectLst>
+            <a:outerShdw blurRad="40000" dist="23000" dir="5400000" rotWithShape="0">
+              <a:srgbClr val="000000">
+                <a:alpha val="35000"/>
+              </a:srgbClr>
+            </a:outerShdw>
+          </a:effectLst>
+          <a:scene3d>
+            <a:camera prst="orthographicFront">
+              <a:rot lat="0" lon="0" rev="0"/>
+            </a:camera>
+            <a:lightRig rig="threePt" dir="t">
+              <a:rot lat="0" lon="0" rev="1200000"/>
+            </a:lightRig>
+          </a:scene3d>
+          <a:sp3d>
+            <a:bevelT w="63500" h="25400"/>
+          </a:sp3d>
+        </a:effectStyle>
+      </a:effectStyleLst>
+      <a:bgFillStyleLst>
+        <a:solidFill>
+          <a:schemeClr val="phClr"/>
+        </a:solidFill>
+        <a:gradFill rotWithShape="1">
+          <a:gsLst>
+            <a:gs pos="0">
+              <a:schemeClr val="phClr">
+                <a:tint val="40000"/>
+                <a:satMod val="350000"/>
+              </a:schemeClr>
+            </a:gs>
+            <a:gs pos="40000">
+              <a:schemeClr val="phClr">
+                <a:tint val="45000"/>
+                <a:shade val="99000"/>
+                <a:satMod val="350000"/>
+              </a:schemeClr>
+            </a:gs>
+            <a:gs pos="100000">
+              <a:schemeClr val="phClr">
+                <a:shade val="20000"/>
+                <a:satMod val="255000"/>
+              </a:schemeClr>
+            </a:gs>
+          </a:gsLst>
+          <a:path path="circle">
+            <a:fillToRect l="50000" t="-80000" r="50000" b="180000"/>
+          </a:path>
+        </a:gradFill>
+        <a:gradFill rotWithShape="1">
+          <a:gsLst>
+            <a:gs pos="0">
+              <a:schemeClr val="phClr">
+                <a:tint val="80000"/>
+                <a:satMod val="300000"/>
+              </a:schemeClr>
+            </a:gs>
+            <a:gs pos="100000">
+              <a:schemeClr val="phClr">
+                <a:shade val="30000"/>
+                <a:satMod val="200000"/>
+              </a:schemeClr>
+            </a:gs>
+          </a:gsLst>
+          <a:path path="circle">
+            <a:fillToRect l="50000" t="50000" r="50000" b="50000"/>
+          </a:path>
+        </a:gradFill>
+      </a:bgFillStyleLst>
+    </a:fmtScheme>
+  </a:themeElements>
+</a:theme>
+</file>
+
+<file path=ppt/theme/theme2.xml><?xml version="1.0" encoding="utf-8"?>
 <a:theme xmlns:a="http://schemas.openxmlformats.org/drawingml/2006/main" xmlns:r="http://schemas.openxmlformats.org/officeDocument/2006/relationships">
   <a:themeElements>
     <a:clrScheme name="Default">
@@ -8972,283 +9225,4 @@
     </a:fmtScheme>
   </a:themeElements>
 </a:theme>
-</file>
-
-<file path=ppt/theme/theme2.xml><?xml version="1.0" encoding="utf-8"?>
-<a:theme xmlns:a="http://schemas.openxmlformats.org/drawingml/2006/main" xmlns:r="http://schemas.openxmlformats.org/officeDocument/2006/relationships" name="Simple Dark">
-  <a:themeElements>
-    <a:clrScheme name="Simple Dark">
-      <a:dk1>
-        <a:srgbClr val="FFFFFF"/>
-      </a:dk1>
-      <a:lt1>
-        <a:srgbClr val="212121"/>
-      </a:lt1>
-      <a:dk2>
-        <a:srgbClr val="303030"/>
-      </a:dk2>
-      <a:lt2>
-        <a:srgbClr val="ADADAD"/>
-      </a:lt2>
-      <a:accent1>
-        <a:srgbClr val="009688"/>
-      </a:accent1>
-      <a:accent2>
-        <a:srgbClr val="EEEEEE"/>
-      </a:accent2>
-      <a:accent3>
-        <a:srgbClr val="78909C"/>
-      </a:accent3>
-      <a:accent4>
-        <a:srgbClr val="FFAB40"/>
-      </a:accent4>
-      <a:accent5>
-        <a:srgbClr val="4DD0E1"/>
-      </a:accent5>
-      <a:accent6>
-        <a:srgbClr val="EEFF41"/>
-      </a:accent6>
-      <a:hlink>
-        <a:srgbClr val="4DD0E1"/>
-      </a:hlink>
-      <a:folHlink>
-        <a:srgbClr val="4DD0E1"/>
-      </a:folHlink>
-    </a:clrScheme>
-    <a:fontScheme name="Office">
-      <a:majorFont>
-        <a:latin typeface="Arial"/>
-        <a:ea typeface=""/>
-        <a:cs typeface=""/>
-        <a:font script="Jpan" typeface="ＭＳ Ｐゴシック"/>
-        <a:font script="Hang" typeface="맑은 고딕"/>
-        <a:font script="Hans" typeface="宋体"/>
-        <a:font script="Hant" typeface="新細明體"/>
-        <a:font script="Arab" typeface="Times New Roman"/>
-        <a:font script="Hebr" typeface="Times New Roman"/>
-        <a:font script="Thai" typeface="Angsana New"/>
-        <a:font script="Ethi" typeface="Nyala"/>
-        <a:font script="Beng" typeface="Vrinda"/>
-        <a:font script="Gujr" typeface="Shruti"/>
-        <a:font script="Khmr" typeface="MoolBoran"/>
-        <a:font script="Knda" typeface="Tunga"/>
-        <a:font script="Guru" typeface="Raavi"/>
-        <a:font script="Cans" typeface="Euphemia"/>
-        <a:font script="Cher" typeface="Plantagenet Cherokee"/>
-        <a:font script="Yiii" typeface="Microsoft Yi Baiti"/>
-        <a:font script="Tibt" typeface="Microsoft Himalaya"/>
-        <a:font script="Thaa" typeface="MV Boli"/>
-        <a:font script="Deva" typeface="Mangal"/>
-        <a:font script="Telu" typeface="Gautami"/>
-        <a:font script="Taml" typeface="Latha"/>
-        <a:font script="Syrc" typeface="Estrangelo Edessa"/>
-        <a:font script="Orya" typeface="Kalinga"/>
-        <a:font script="Mlym" typeface="Kartika"/>
-        <a:font script="Laoo" typeface="DokChampa"/>
-        <a:font script="Sinh" typeface="Iskoola Pota"/>
-        <a:font script="Mong" typeface="Mongolian Baiti"/>
-        <a:font script="Viet" typeface="Times New Roman"/>
-        <a:font script="Uigh" typeface="Microsoft Uighur"/>
-        <a:font script="Geor" typeface="Sylfaen"/>
-      </a:majorFont>
-      <a:minorFont>
-        <a:latin typeface="Arial"/>
-        <a:ea typeface=""/>
-        <a:cs typeface=""/>
-        <a:font script="Jpan" typeface="ＭＳ Ｐゴシック"/>
-        <a:font script="Hang" typeface="맑은 고딕"/>
-        <a:font script="Hans" typeface="宋体"/>
-        <a:font script="Hant" typeface="新細明體"/>
-        <a:font script="Arab" typeface="Arial"/>
-        <a:font script="Hebr" typeface="Arial"/>
-        <a:font script="Thai" typeface="Cordia New"/>
-        <a:font script="Ethi" typeface="Nyala"/>
-        <a:font script="Beng" typeface="Vrinda"/>
-        <a:font script="Gujr" typeface="Shruti"/>
-        <a:font script="Khmr" typeface="DaunPenh"/>
-        <a:font script="Knda" typeface="Tunga"/>
-        <a:font script="Guru" typeface="Raavi"/>
-        <a:font script="Cans" typeface="Euphemia"/>
-        <a:font script="Cher" typeface="Plantagenet Cherokee"/>
-        <a:font script="Yiii" typeface="Microsoft Yi Baiti"/>
-        <a:font script="Tibt" typeface="Microsoft Himalaya"/>
-        <a:font script="Thaa" typeface="MV Boli"/>
-        <a:font script="Deva" typeface="Mangal"/>
-        <a:font script="Telu" typeface="Gautami"/>
-        <a:font script="Taml" typeface="Latha"/>
-        <a:font script="Syrc" typeface="Estrangelo Edessa"/>
-        <a:font script="Orya" typeface="Kalinga"/>
-        <a:font script="Mlym" typeface="Kartika"/>
-        <a:font script="Laoo" typeface="DokChampa"/>
-        <a:font script="Sinh" typeface="Iskoola Pota"/>
-        <a:font script="Mong" typeface="Mongolian Baiti"/>
-        <a:font script="Viet" typeface="Arial"/>
-        <a:font script="Uigh" typeface="Microsoft Uighur"/>
-        <a:font script="Geor" typeface="Sylfaen"/>
-      </a:minorFont>
-    </a:fontScheme>
-    <a:fmtScheme name="Office">
-      <a:fillStyleLst>
-        <a:solidFill>
-          <a:schemeClr val="phClr"/>
-        </a:solidFill>
-        <a:gradFill rotWithShape="1">
-          <a:gsLst>
-            <a:gs pos="0">
-              <a:schemeClr val="phClr">
-                <a:tint val="50000"/>
-                <a:satMod val="300000"/>
-              </a:schemeClr>
-            </a:gs>
-            <a:gs pos="35000">
-              <a:schemeClr val="phClr">
-                <a:tint val="37000"/>
-                <a:satMod val="300000"/>
-              </a:schemeClr>
-            </a:gs>
-            <a:gs pos="100000">
-              <a:schemeClr val="phClr">
-                <a:tint val="15000"/>
-                <a:satMod val="350000"/>
-              </a:schemeClr>
-            </a:gs>
-          </a:gsLst>
-          <a:lin ang="16200000" scaled="1"/>
-        </a:gradFill>
-        <a:gradFill rotWithShape="1">
-          <a:gsLst>
-            <a:gs pos="0">
-              <a:schemeClr val="phClr">
-                <a:tint val="100000"/>
-                <a:shade val="100000"/>
-                <a:satMod val="130000"/>
-              </a:schemeClr>
-            </a:gs>
-            <a:gs pos="100000">
-              <a:schemeClr val="phClr">
-                <a:tint val="50000"/>
-                <a:shade val="100000"/>
-                <a:satMod val="350000"/>
-              </a:schemeClr>
-            </a:gs>
-          </a:gsLst>
-          <a:lin ang="16200000" scaled="0"/>
-        </a:gradFill>
-      </a:fillStyleLst>
-      <a:lnStyleLst>
-        <a:ln w="9525" cap="flat" cmpd="sng" algn="ctr">
-          <a:solidFill>
-            <a:schemeClr val="phClr">
-              <a:shade val="95000"/>
-              <a:satMod val="105000"/>
-            </a:schemeClr>
-          </a:solidFill>
-          <a:prstDash val="solid"/>
-        </a:ln>
-        <a:ln w="25400" cap="flat" cmpd="sng" algn="ctr">
-          <a:solidFill>
-            <a:schemeClr val="phClr"/>
-          </a:solidFill>
-          <a:prstDash val="solid"/>
-        </a:ln>
-        <a:ln w="38100" cap="flat" cmpd="sng" algn="ctr">
-          <a:solidFill>
-            <a:schemeClr val="phClr"/>
-          </a:solidFill>
-          <a:prstDash val="solid"/>
-        </a:ln>
-      </a:lnStyleLst>
-      <a:effectStyleLst>
-        <a:effectStyle>
-          <a:effectLst>
-            <a:outerShdw blurRad="40000" dist="20000" dir="5400000" rotWithShape="0">
-              <a:srgbClr val="000000">
-                <a:alpha val="38000"/>
-              </a:srgbClr>
-            </a:outerShdw>
-          </a:effectLst>
-        </a:effectStyle>
-        <a:effectStyle>
-          <a:effectLst>
-            <a:outerShdw blurRad="40000" dist="23000" dir="5400000" rotWithShape="0">
-              <a:srgbClr val="000000">
-                <a:alpha val="35000"/>
-              </a:srgbClr>
-            </a:outerShdw>
-          </a:effectLst>
-        </a:effectStyle>
-        <a:effectStyle>
-          <a:effectLst>
-            <a:outerShdw blurRad="40000" dist="23000" dir="5400000" rotWithShape="0">
-              <a:srgbClr val="000000">
-                <a:alpha val="35000"/>
-              </a:srgbClr>
-            </a:outerShdw>
-          </a:effectLst>
-          <a:scene3d>
-            <a:camera prst="orthographicFront">
-              <a:rot lat="0" lon="0" rev="0"/>
-            </a:camera>
-            <a:lightRig rig="threePt" dir="t">
-              <a:rot lat="0" lon="0" rev="1200000"/>
-            </a:lightRig>
-          </a:scene3d>
-          <a:sp3d>
-            <a:bevelT w="63500" h="25400"/>
-          </a:sp3d>
-        </a:effectStyle>
-      </a:effectStyleLst>
-      <a:bgFillStyleLst>
-        <a:solidFill>
-          <a:schemeClr val="phClr"/>
-        </a:solidFill>
-        <a:gradFill rotWithShape="1">
-          <a:gsLst>
-            <a:gs pos="0">
-              <a:schemeClr val="phClr">
-                <a:tint val="40000"/>
-                <a:satMod val="350000"/>
-              </a:schemeClr>
-            </a:gs>
-            <a:gs pos="40000">
-              <a:schemeClr val="phClr">
-                <a:tint val="45000"/>
-                <a:shade val="99000"/>
-                <a:satMod val="350000"/>
-              </a:schemeClr>
-            </a:gs>
-            <a:gs pos="100000">
-              <a:schemeClr val="phClr">
-                <a:shade val="20000"/>
-                <a:satMod val="255000"/>
-              </a:schemeClr>
-            </a:gs>
-          </a:gsLst>
-          <a:path path="circle">
-            <a:fillToRect l="50000" t="-80000" r="50000" b="180000"/>
-          </a:path>
-        </a:gradFill>
-        <a:gradFill rotWithShape="1">
-          <a:gsLst>
-            <a:gs pos="0">
-              <a:schemeClr val="phClr">
-                <a:tint val="80000"/>
-                <a:satMod val="300000"/>
-              </a:schemeClr>
-            </a:gs>
-            <a:gs pos="100000">
-              <a:schemeClr val="phClr">
-                <a:shade val="30000"/>
-                <a:satMod val="200000"/>
-              </a:schemeClr>
-            </a:gs>
-          </a:gsLst>
-          <a:path path="circle">
-            <a:fillToRect l="50000" t="50000" r="50000" b="50000"/>
-          </a:path>
-        </a:gradFill>
-      </a:bgFillStyleLst>
-    </a:fmtScheme>
-  </a:themeElements>
-</a:theme>
 </file>
</xml_diff>